<commit_message>
:information_desk_person: updated solution capture form
</commit_message>
<xml_diff>
--- a/training/Solutions/SubmittingSolutions/SolutionTemplate.pptx
+++ b/training/Solutions/SubmittingSolutions/SolutionTemplate.pptx
@@ -5,17 +5,18 @@
     <p:sldMasterId id="2147483648" r:id="rId1"/>
   </p:sldMasterIdLst>
   <p:notesMasterIdLst>
-    <p:notesMasterId r:id="rId7"/>
+    <p:notesMasterId r:id="rId8"/>
   </p:notesMasterIdLst>
   <p:handoutMasterIdLst>
-    <p:handoutMasterId r:id="rId8"/>
+    <p:handoutMasterId r:id="rId9"/>
   </p:handoutMasterIdLst>
   <p:sldIdLst>
     <p:sldId id="266" r:id="rId2"/>
     <p:sldId id="265" r:id="rId3"/>
-    <p:sldId id="268" r:id="rId4"/>
-    <p:sldId id="269" r:id="rId5"/>
-    <p:sldId id="267" r:id="rId6"/>
+    <p:sldId id="270" r:id="rId4"/>
+    <p:sldId id="268" r:id="rId5"/>
+    <p:sldId id="269" r:id="rId6"/>
+    <p:sldId id="267" r:id="rId7"/>
   </p:sldIdLst>
   <p:sldSz cx="14630400" cy="8229600"/>
   <p:notesSz cx="6858000" cy="9144000"/>
@@ -207,626 +208,105 @@
 </p:presentation>
 </file>
 
+<file path=ppt/revisionInfo.xml><?xml version="1.0" encoding="utf-8"?>
+<p1510:revInfo xmlns:a="http://schemas.openxmlformats.org/drawingml/2006/main" xmlns:r="http://schemas.openxmlformats.org/officeDocument/2006/relationships" xmlns:p1510="http://schemas.microsoft.com/office/powerpoint/2015/10/main">
+  <p1510:revLst>
+    <p1510:client id="{6C228DF4-3895-4408-8CE6-F377302748CF}" v="3" dt="2018-11-15T13:00:24.754"/>
+  </p1510:revLst>
+</p1510:revInfo>
+</file>
+
 <file path=ppt/changesInfos/changesInfo1.xml><?xml version="1.0" encoding="utf-8"?>
 <pc:chgInfo xmlns:a="http://schemas.openxmlformats.org/drawingml/2006/main" xmlns:r="http://schemas.openxmlformats.org/officeDocument/2006/relationships" xmlns:ac="http://schemas.microsoft.com/office/drawing/2013/main/command" xmlns:pc="http://schemas.microsoft.com/office/powerpoint/2013/main/command">
   <pc:docChgLst>
-    <pc:chgData name="David Stevens" userId="b6815b1ecc207c78" providerId="LiveId" clId="{8D4FFD78-CC3C-461E-B079-5CDBD4E7414A}"/>
-    <pc:docChg chg="undo addSld delSld modSld">
-      <pc:chgData name="David Stevens" userId="b6815b1ecc207c78" providerId="LiveId" clId="{8D4FFD78-CC3C-461E-B079-5CDBD4E7414A}" dt="2018-06-07T13:12:43.562" v="76" actId="14100"/>
+    <pc:chgData name="David Stevens" userId="73fe415a-d21a-4898-bfab-0e75d37181d7" providerId="ADAL" clId="{6C228DF4-3895-4408-8CE6-F377302748CF}"/>
+    <pc:docChg chg="undo custSel addSld modSld">
+      <pc:chgData name="David Stevens" userId="73fe415a-d21a-4898-bfab-0e75d37181d7" providerId="ADAL" clId="{6C228DF4-3895-4408-8CE6-F377302748CF}" dt="2018-11-15T13:31:10.997" v="232" actId="313"/>
       <pc:docMkLst>
         <pc:docMk/>
       </pc:docMkLst>
-      <pc:sldChg chg="add del">
-        <pc:chgData name="David Stevens" userId="b6815b1ecc207c78" providerId="LiveId" clId="{8D4FFD78-CC3C-461E-B079-5CDBD4E7414A}" dt="2018-06-07T13:12:29.437" v="34" actId="2696"/>
-        <pc:sldMkLst>
-          <pc:docMk/>
-          <pc:sldMk cId="1533850937" sldId="256"/>
-        </pc:sldMkLst>
-      </pc:sldChg>
-      <pc:sldChg chg="add del">
-        <pc:chgData name="David Stevens" userId="b6815b1ecc207c78" providerId="LiveId" clId="{8D4FFD78-CC3C-461E-B079-5CDBD4E7414A}" dt="2018-06-07T13:12:29.439" v="35" actId="2696"/>
-        <pc:sldMkLst>
-          <pc:docMk/>
-          <pc:sldMk cId="4203890084" sldId="257"/>
-        </pc:sldMkLst>
-      </pc:sldChg>
-      <pc:sldChg chg="add del">
-        <pc:chgData name="David Stevens" userId="b6815b1ecc207c78" providerId="LiveId" clId="{8D4FFD78-CC3C-461E-B079-5CDBD4E7414A}" dt="2018-06-07T13:12:29.444" v="37" actId="2696"/>
-        <pc:sldMkLst>
-          <pc:docMk/>
-          <pc:sldMk cId="2042021261" sldId="258"/>
-        </pc:sldMkLst>
-      </pc:sldChg>
-      <pc:sldChg chg="add del">
-        <pc:chgData name="David Stevens" userId="b6815b1ecc207c78" providerId="LiveId" clId="{8D4FFD78-CC3C-461E-B079-5CDBD4E7414A}" dt="2018-06-07T13:12:29.455" v="39" actId="2696"/>
-        <pc:sldMkLst>
-          <pc:docMk/>
-          <pc:sldMk cId="1114119429" sldId="260"/>
-        </pc:sldMkLst>
-      </pc:sldChg>
-      <pc:sldChg chg="add del">
-        <pc:chgData name="David Stevens" userId="b6815b1ecc207c78" providerId="LiveId" clId="{8D4FFD78-CC3C-461E-B079-5CDBD4E7414A}" dt="2018-06-07T13:12:29.459" v="41" actId="2696"/>
-        <pc:sldMkLst>
-          <pc:docMk/>
-          <pc:sldMk cId="2058922302" sldId="261"/>
-        </pc:sldMkLst>
-      </pc:sldChg>
-      <pc:sldChg chg="add del">
-        <pc:chgData name="David Stevens" userId="b6815b1ecc207c78" providerId="LiveId" clId="{8D4FFD78-CC3C-461E-B079-5CDBD4E7414A}" dt="2018-06-07T13:12:29.461" v="42" actId="2696"/>
-        <pc:sldMkLst>
-          <pc:docMk/>
-          <pc:sldMk cId="1449213109" sldId="262"/>
-        </pc:sldMkLst>
-      </pc:sldChg>
-      <pc:sldChg chg="add del">
-        <pc:chgData name="David Stevens" userId="b6815b1ecc207c78" providerId="LiveId" clId="{8D4FFD78-CC3C-461E-B079-5CDBD4E7414A}" dt="2018-06-07T13:12:29.435" v="33" actId="2696"/>
-        <pc:sldMkLst>
-          <pc:docMk/>
-          <pc:sldMk cId="3685558425" sldId="263"/>
-        </pc:sldMkLst>
-      </pc:sldChg>
-      <pc:sldChg chg="del">
-        <pc:chgData name="David Stevens" userId="b6815b1ecc207c78" providerId="LiveId" clId="{8D4FFD78-CC3C-461E-B079-5CDBD4E7414A}" dt="2018-06-07T13:12:19.003" v="0" actId="2696"/>
-        <pc:sldMkLst>
-          <pc:docMk/>
-          <pc:sldMk cId="3446096463" sldId="264"/>
-        </pc:sldMkLst>
-      </pc:sldChg>
-      <pc:sldChg chg="add del">
-        <pc:chgData name="David Stevens" userId="b6815b1ecc207c78" providerId="LiveId" clId="{8D4FFD78-CC3C-461E-B079-5CDBD4E7414A}" dt="2018-06-07T13:12:22.540" v="19" actId="2696"/>
-        <pc:sldMkLst>
-          <pc:docMk/>
-          <pc:sldMk cId="3298495254" sldId="265"/>
-        </pc:sldMkLst>
-      </pc:sldChg>
-      <pc:sldChg chg="modSp add del">
-        <pc:chgData name="David Stevens" userId="b6815b1ecc207c78" providerId="LiveId" clId="{8D4FFD78-CC3C-461E-B079-5CDBD4E7414A}" dt="2018-06-07T13:12:43.562" v="76" actId="14100"/>
-        <pc:sldMkLst>
-          <pc:docMk/>
-          <pc:sldMk cId="3084996657" sldId="266"/>
-        </pc:sldMkLst>
-        <pc:spChg chg="mod">
-          <ac:chgData name="David Stevens" userId="b6815b1ecc207c78" providerId="LiveId" clId="{8D4FFD78-CC3C-461E-B079-5CDBD4E7414A}" dt="2018-06-07T13:12:43.562" v="76" actId="14100"/>
-          <ac:spMkLst>
-            <pc:docMk/>
-            <pc:sldMk cId="3084996657" sldId="266"/>
-            <ac:spMk id="2" creationId="{BF55172A-1F73-4D1F-B45F-E822560CAE25}"/>
-          </ac:spMkLst>
-        </pc:spChg>
-      </pc:sldChg>
-      <pc:sldChg chg="add del">
-        <pc:chgData name="David Stevens" userId="b6815b1ecc207c78" providerId="LiveId" clId="{8D4FFD78-CC3C-461E-B079-5CDBD4E7414A}" dt="2018-06-07T13:12:22.605" v="32" actId="2696"/>
-        <pc:sldMkLst>
-          <pc:docMk/>
-          <pc:sldMk cId="3698650892" sldId="267"/>
-        </pc:sldMkLst>
-      </pc:sldChg>
-      <pc:sldChg chg="add del">
-        <pc:chgData name="David Stevens" userId="b6815b1ecc207c78" providerId="LiveId" clId="{8D4FFD78-CC3C-461E-B079-5CDBD4E7414A}" dt="2018-06-07T13:12:22.539" v="18" actId="2696"/>
+      <pc:sldChg chg="modSp">
+        <pc:chgData name="David Stevens" userId="73fe415a-d21a-4898-bfab-0e75d37181d7" providerId="ADAL" clId="{6C228DF4-3895-4408-8CE6-F377302748CF}" dt="2018-11-15T12:59:51.743" v="59" actId="20577"/>
         <pc:sldMkLst>
           <pc:docMk/>
           <pc:sldMk cId="94511389" sldId="268"/>
         </pc:sldMkLst>
+        <pc:spChg chg="mod">
+          <ac:chgData name="David Stevens" userId="73fe415a-d21a-4898-bfab-0e75d37181d7" providerId="ADAL" clId="{6C228DF4-3895-4408-8CE6-F377302748CF}" dt="2018-11-15T12:59:51.743" v="59" actId="20577"/>
+          <ac:spMkLst>
+            <pc:docMk/>
+            <pc:sldMk cId="94511389" sldId="268"/>
+            <ac:spMk id="2" creationId="{2B77B97E-62A9-4F68-85A1-448CE4C9CA7A}"/>
+          </ac:spMkLst>
+        </pc:spChg>
       </pc:sldChg>
-      <pc:sldChg chg="add del">
-        <pc:chgData name="David Stevens" userId="b6815b1ecc207c78" providerId="LiveId" clId="{8D4FFD78-CC3C-461E-B079-5CDBD4E7414A}" dt="2018-06-07T13:12:22.538" v="17" actId="2696"/>
+      <pc:sldChg chg="modSp">
+        <pc:chgData name="David Stevens" userId="73fe415a-d21a-4898-bfab-0e75d37181d7" providerId="ADAL" clId="{6C228DF4-3895-4408-8CE6-F377302748CF}" dt="2018-11-15T13:00:05.964" v="76" actId="6549"/>
         <pc:sldMkLst>
           <pc:docMk/>
           <pc:sldMk cId="1512659947" sldId="269"/>
         </pc:sldMkLst>
+        <pc:spChg chg="mod">
+          <ac:chgData name="David Stevens" userId="73fe415a-d21a-4898-bfab-0e75d37181d7" providerId="ADAL" clId="{6C228DF4-3895-4408-8CE6-F377302748CF}" dt="2018-11-15T13:00:05.964" v="76" actId="6549"/>
+          <ac:spMkLst>
+            <pc:docMk/>
+            <pc:sldMk cId="1512659947" sldId="269"/>
+            <ac:spMk id="11" creationId="{A6A06041-6114-4EA1-A574-62DCEF8B4CC1}"/>
+          </ac:spMkLst>
+        </pc:spChg>
+        <pc:graphicFrameChg chg="mod modGraphic">
+          <ac:chgData name="David Stevens" userId="73fe415a-d21a-4898-bfab-0e75d37181d7" providerId="ADAL" clId="{6C228DF4-3895-4408-8CE6-F377302748CF}" dt="2018-11-15T12:59:58.460" v="62" actId="1076"/>
+          <ac:graphicFrameMkLst>
+            <pc:docMk/>
+            <pc:sldMk cId="1512659947" sldId="269"/>
+            <ac:graphicFrameMk id="12" creationId="{8BAF2E80-B207-43F9-AD81-BFFCD48D8F56}"/>
+          </ac:graphicFrameMkLst>
+        </pc:graphicFrameChg>
       </pc:sldChg>
-      <pc:sldChg chg="add del">
-        <pc:chgData name="David Stevens" userId="b6815b1ecc207c78" providerId="LiveId" clId="{8D4FFD78-CC3C-461E-B079-5CDBD4E7414A}" dt="2018-06-07T13:12:29.442" v="36" actId="2696"/>
+      <pc:sldChg chg="addSp modSp add">
+        <pc:chgData name="David Stevens" userId="73fe415a-d21a-4898-bfab-0e75d37181d7" providerId="ADAL" clId="{6C228DF4-3895-4408-8CE6-F377302748CF}" dt="2018-11-15T13:31:10.997" v="232" actId="313"/>
         <pc:sldMkLst>
           <pc:docMk/>
-          <pc:sldMk cId="718711563" sldId="270"/>
-        </pc:sldMkLst>
-      </pc:sldChg>
-      <pc:sldChg chg="add del">
-        <pc:chgData name="David Stevens" userId="b6815b1ecc207c78" providerId="LiveId" clId="{8D4FFD78-CC3C-461E-B079-5CDBD4E7414A}" dt="2018-06-07T13:12:29.463" v="43" actId="2696"/>
-        <pc:sldMkLst>
-          <pc:docMk/>
-          <pc:sldMk cId="967135108" sldId="272"/>
-        </pc:sldMkLst>
-      </pc:sldChg>
-      <pc:sldChg chg="add del">
-        <pc:chgData name="David Stevens" userId="b6815b1ecc207c78" providerId="LiveId" clId="{8D4FFD78-CC3C-461E-B079-5CDBD4E7414A}" dt="2018-06-07T13:12:29.456" v="40" actId="2696"/>
-        <pc:sldMkLst>
-          <pc:docMk/>
-          <pc:sldMk cId="1791255816" sldId="273"/>
-        </pc:sldMkLst>
-      </pc:sldChg>
-      <pc:sldChg chg="add del">
-        <pc:chgData name="David Stevens" userId="b6815b1ecc207c78" providerId="LiveId" clId="{8D4FFD78-CC3C-461E-B079-5CDBD4E7414A}" dt="2018-06-07T13:12:29.453" v="38" actId="2696"/>
-        <pc:sldMkLst>
-          <pc:docMk/>
-          <pc:sldMk cId="3784613730" sldId="274"/>
-        </pc:sldMkLst>
-      </pc:sldChg>
-    </pc:docChg>
-  </pc:docChgLst>
-  <pc:docChgLst>
-    <pc:chgData name="David Stevens" userId="ac0626e3-72c9-46ef-be9c-68c7f11863b4" providerId="ADAL" clId="{5A8470FC-7560-4602-8EED-10D72E069B3A}"/>
-    <pc:docChg chg="undo custSel addSld delSld modSld">
-      <pc:chgData name="David Stevens" userId="ac0626e3-72c9-46ef-be9c-68c7f11863b4" providerId="ADAL" clId="{5A8470FC-7560-4602-8EED-10D72E069B3A}" dt="2018-06-04T15:27:14.321" v="555" actId="20577"/>
-      <pc:docMkLst>
-        <pc:docMk/>
-      </pc:docMkLst>
-      <pc:sldChg chg="modSp">
-        <pc:chgData name="David Stevens" userId="ac0626e3-72c9-46ef-be9c-68c7f11863b4" providerId="ADAL" clId="{5A8470FC-7560-4602-8EED-10D72E069B3A}" dt="2018-06-04T12:08:44.389" v="79" actId="14100"/>
-        <pc:sldMkLst>
-          <pc:docMk/>
-          <pc:sldMk cId="4203890084" sldId="257"/>
+          <pc:sldMk cId="269264897" sldId="270"/>
         </pc:sldMkLst>
         <pc:spChg chg="mod">
-          <ac:chgData name="David Stevens" userId="ac0626e3-72c9-46ef-be9c-68c7f11863b4" providerId="ADAL" clId="{5A8470FC-7560-4602-8EED-10D72E069B3A}" dt="2018-06-04T12:08:44.389" v="79" actId="14100"/>
+          <ac:chgData name="David Stevens" userId="73fe415a-d21a-4898-bfab-0e75d37181d7" providerId="ADAL" clId="{6C228DF4-3895-4408-8CE6-F377302748CF}" dt="2018-11-15T12:59:49.464" v="58" actId="20577"/>
           <ac:spMkLst>
             <pc:docMk/>
-            <pc:sldMk cId="4203890084" sldId="257"/>
-            <ac:spMk id="3" creationId="{BAEE1B0D-8B6E-4EE3-A48D-E0E7091E3AD2}"/>
+            <pc:sldMk cId="269264897" sldId="270"/>
+            <ac:spMk id="2" creationId="{2B77B97E-62A9-4F68-85A1-448CE4C9CA7A}"/>
           </ac:spMkLst>
         </pc:spChg>
-      </pc:sldChg>
-      <pc:sldChg chg="modSp">
-        <pc:chgData name="David Stevens" userId="ac0626e3-72c9-46ef-be9c-68c7f11863b4" providerId="ADAL" clId="{5A8470FC-7560-4602-8EED-10D72E069B3A}" dt="2018-06-04T12:15:47.443" v="463" actId="113"/>
-        <pc:sldMkLst>
-          <pc:docMk/>
-          <pc:sldMk cId="1114119429" sldId="260"/>
-        </pc:sldMkLst>
-        <pc:spChg chg="mod">
-          <ac:chgData name="David Stevens" userId="ac0626e3-72c9-46ef-be9c-68c7f11863b4" providerId="ADAL" clId="{5A8470FC-7560-4602-8EED-10D72E069B3A}" dt="2018-06-04T12:15:47.443" v="463" actId="113"/>
-          <ac:spMkLst>
-            <pc:docMk/>
-            <pc:sldMk cId="1114119429" sldId="260"/>
-            <ac:spMk id="12" creationId="{8FF0A0F7-3E8A-46D6-9385-D41D34CBF980}"/>
-          </ac:spMkLst>
-        </pc:spChg>
-      </pc:sldChg>
-      <pc:sldChg chg="addSp delSp modSp add">
-        <pc:chgData name="David Stevens" userId="ac0626e3-72c9-46ef-be9c-68c7f11863b4" providerId="ADAL" clId="{5A8470FC-7560-4602-8EED-10D72E069B3A}" dt="2018-06-04T15:27:14.321" v="555" actId="20577"/>
-        <pc:sldMkLst>
-          <pc:docMk/>
-          <pc:sldMk cId="3784613730" sldId="274"/>
-        </pc:sldMkLst>
-        <pc:spChg chg="del">
-          <ac:chgData name="David Stevens" userId="ac0626e3-72c9-46ef-be9c-68c7f11863b4" providerId="ADAL" clId="{5A8470FC-7560-4602-8EED-10D72E069B3A}" dt="2018-06-04T12:09:14.088" v="81" actId="20577"/>
-          <ac:spMkLst>
-            <pc:docMk/>
-            <pc:sldMk cId="3784613730" sldId="274"/>
-            <ac:spMk id="2" creationId="{FD4508A9-4D92-408C-BC31-292A3D88DD14}"/>
-          </ac:spMkLst>
-        </pc:spChg>
-        <pc:spChg chg="del">
-          <ac:chgData name="David Stevens" userId="ac0626e3-72c9-46ef-be9c-68c7f11863b4" providerId="ADAL" clId="{5A8470FC-7560-4602-8EED-10D72E069B3A}" dt="2018-06-04T12:09:14.088" v="81" actId="20577"/>
-          <ac:spMkLst>
-            <pc:docMk/>
-            <pc:sldMk cId="3784613730" sldId="274"/>
-            <ac:spMk id="3" creationId="{827798DF-58CA-453E-B5F6-50422A291F94}"/>
-          </ac:spMkLst>
-        </pc:spChg>
-        <pc:spChg chg="del">
-          <ac:chgData name="David Stevens" userId="ac0626e3-72c9-46ef-be9c-68c7f11863b4" providerId="ADAL" clId="{5A8470FC-7560-4602-8EED-10D72E069B3A}" dt="2018-06-04T12:09:14.088" v="81" actId="20577"/>
-          <ac:spMkLst>
-            <pc:docMk/>
-            <pc:sldMk cId="3784613730" sldId="274"/>
-            <ac:spMk id="4" creationId="{3A640E91-C047-43B8-837C-8EB68CF71B9E}"/>
-          </ac:spMkLst>
-        </pc:spChg>
-        <pc:spChg chg="add mod">
-          <ac:chgData name="David Stevens" userId="ac0626e3-72c9-46ef-be9c-68c7f11863b4" providerId="ADAL" clId="{5A8470FC-7560-4602-8EED-10D72E069B3A}" dt="2018-06-04T12:15:08.526" v="454" actId="20577"/>
-          <ac:spMkLst>
-            <pc:docMk/>
-            <pc:sldMk cId="3784613730" sldId="274"/>
-            <ac:spMk id="5" creationId="{BB01F945-ABE6-4E41-8178-762DFF539FD3}"/>
-          </ac:spMkLst>
-        </pc:spChg>
-        <pc:spChg chg="add del mod">
-          <ac:chgData name="David Stevens" userId="ac0626e3-72c9-46ef-be9c-68c7f11863b4" providerId="ADAL" clId="{5A8470FC-7560-4602-8EED-10D72E069B3A}" dt="2018-06-04T12:09:44.895" v="82" actId="1032"/>
-          <ac:spMkLst>
-            <pc:docMk/>
-            <pc:sldMk cId="3784613730" sldId="274"/>
-            <ac:spMk id="6" creationId="{EFEDC426-00A4-441D-B169-A3CF3DE2DB81}"/>
-          </ac:spMkLst>
-        </pc:spChg>
-        <pc:graphicFrameChg chg="add mod">
-          <ac:chgData name="David Stevens" userId="ac0626e3-72c9-46ef-be9c-68c7f11863b4" providerId="ADAL" clId="{5A8470FC-7560-4602-8EED-10D72E069B3A}" dt="2018-06-04T15:27:14.321" v="555" actId="20577"/>
+        <pc:graphicFrameChg chg="modGraphic">
+          <ac:chgData name="David Stevens" userId="73fe415a-d21a-4898-bfab-0e75d37181d7" providerId="ADAL" clId="{6C228DF4-3895-4408-8CE6-F377302748CF}" dt="2018-11-15T13:31:10.997" v="232" actId="313"/>
           <ac:graphicFrameMkLst>
             <pc:docMk/>
-            <pc:sldMk cId="3784613730" sldId="274"/>
-            <ac:graphicFrameMk id="7" creationId="{01D2BD1C-4107-4176-9728-F779D6BFB2AD}"/>
+            <pc:sldMk cId="269264897" sldId="270"/>
+            <ac:graphicFrameMk id="4" creationId="{8859AE11-1258-4695-8E3B-F6DEC684EAE0}"/>
+          </ac:graphicFrameMkLst>
+        </pc:graphicFrameChg>
+        <pc:graphicFrameChg chg="add mod modGraphic">
+          <ac:chgData name="David Stevens" userId="73fe415a-d21a-4898-bfab-0e75d37181d7" providerId="ADAL" clId="{6C228DF4-3895-4408-8CE6-F377302748CF}" dt="2018-11-15T13:31:08.330" v="231" actId="20577"/>
+          <ac:graphicFrameMkLst>
+            <pc:docMk/>
+            <pc:sldMk cId="269264897" sldId="270"/>
+            <ac:graphicFrameMk id="7" creationId="{4E3218CD-0420-4A7D-A8A2-EC1E63321C78}"/>
           </ac:graphicFrameMkLst>
         </pc:graphicFrameChg>
       </pc:sldChg>
     </pc:docChg>
   </pc:docChgLst>
   <pc:docChgLst>
+    <pc:chgData name="David Stevens" userId="b6815b1ecc207c78" providerId="LiveId" clId="{8D4FFD78-CC3C-461E-B079-5CDBD4E7414A}"/>
+  </pc:docChgLst>
+  <pc:docChgLst>
+    <pc:chgData name="David Stevens" userId="ac0626e3-72c9-46ef-be9c-68c7f11863b4" providerId="ADAL" clId="{5A8470FC-7560-4602-8EED-10D72E069B3A}"/>
+  </pc:docChgLst>
+  <pc:docChgLst>
     <pc:chgData name="Stevens, David" userId="ac0626e3-72c9-46ef-be9c-68c7f11863b4" providerId="ADAL" clId="{0CE6FB5B-D968-4196-8FC3-15160774DB9F}"/>
   </pc:docChgLst>
   <pc:docChgLst>
     <pc:chgData name="David Stevens" userId="b6815b1ecc207c78" providerId="LiveId" clId="{B9A93E34-1E50-46C2-891E-93910431F02B}"/>
-    <pc:docChg chg="undo custSel addSld modSld sldOrd">
-      <pc:chgData name="David Stevens" userId="b6815b1ecc207c78" providerId="LiveId" clId="{B9A93E34-1E50-46C2-891E-93910431F02B}" dt="2018-06-01T14:11:40.822" v="1496" actId="122"/>
-      <pc:docMkLst>
-        <pc:docMk/>
-      </pc:docMkLst>
-      <pc:sldChg chg="ord">
-        <pc:chgData name="David Stevens" userId="b6815b1ecc207c78" providerId="LiveId" clId="{B9A93E34-1E50-46C2-891E-93910431F02B}" dt="2018-06-01T12:56:36.035" v="621" actId="122"/>
-        <pc:sldMkLst>
-          <pc:docMk/>
-          <pc:sldMk cId="2042021261" sldId="258"/>
-        </pc:sldMkLst>
-      </pc:sldChg>
-      <pc:sldChg chg="addSp delSp modSp">
-        <pc:chgData name="David Stevens" userId="b6815b1ecc207c78" providerId="LiveId" clId="{B9A93E34-1E50-46C2-891E-93910431F02B}" dt="2018-06-01T14:11:40.822" v="1496" actId="122"/>
-        <pc:sldMkLst>
-          <pc:docMk/>
-          <pc:sldMk cId="1114119429" sldId="260"/>
-        </pc:sldMkLst>
-        <pc:spChg chg="del">
-          <ac:chgData name="David Stevens" userId="b6815b1ecc207c78" providerId="LiveId" clId="{B9A93E34-1E50-46C2-891E-93910431F02B}" dt="2018-06-01T13:15:53.141" v="1077" actId="478"/>
-          <ac:spMkLst>
-            <pc:docMk/>
-            <pc:sldMk cId="1114119429" sldId="260"/>
-            <ac:spMk id="2" creationId="{5FD4BDA5-CD56-4900-AE8C-D2FA3E90DA61}"/>
-          </ac:spMkLst>
-        </pc:spChg>
-        <pc:spChg chg="mod">
-          <ac:chgData name="David Stevens" userId="b6815b1ecc207c78" providerId="LiveId" clId="{B9A93E34-1E50-46C2-891E-93910431F02B}" dt="2018-06-01T13:15:49.074" v="1076" actId="20577"/>
-          <ac:spMkLst>
-            <pc:docMk/>
-            <pc:sldMk cId="1114119429" sldId="260"/>
-            <ac:spMk id="3" creationId="{A5AF0DC5-393E-4548-933C-38216C80562D}"/>
-          </ac:spMkLst>
-        </pc:spChg>
-        <pc:spChg chg="del mod">
-          <ac:chgData name="David Stevens" userId="b6815b1ecc207c78" providerId="LiveId" clId="{B9A93E34-1E50-46C2-891E-93910431F02B}" dt="2018-06-01T13:25:02.023" v="1128" actId="122"/>
-          <ac:spMkLst>
-            <pc:docMk/>
-            <pc:sldMk cId="1114119429" sldId="260"/>
-            <ac:spMk id="4" creationId="{BF44B7D7-EDE8-42AE-B4A7-52879D672463}"/>
-          </ac:spMkLst>
-        </pc:spChg>
-        <pc:spChg chg="add del mod">
-          <ac:chgData name="David Stevens" userId="b6815b1ecc207c78" providerId="LiveId" clId="{B9A93E34-1E50-46C2-891E-93910431F02B}" dt="2018-06-01T13:25:02.023" v="1128" actId="122"/>
-          <ac:spMkLst>
-            <pc:docMk/>
-            <pc:sldMk cId="1114119429" sldId="260"/>
-            <ac:spMk id="10" creationId="{69D670D5-D515-46BD-9078-1015639E9E99}"/>
-          </ac:spMkLst>
-        </pc:spChg>
-        <pc:spChg chg="add mod">
-          <ac:chgData name="David Stevens" userId="b6815b1ecc207c78" providerId="LiveId" clId="{B9A93E34-1E50-46C2-891E-93910431F02B}" dt="2018-06-01T13:25:02.023" v="1128" actId="122"/>
-          <ac:spMkLst>
-            <pc:docMk/>
-            <pc:sldMk cId="1114119429" sldId="260"/>
-            <ac:spMk id="11" creationId="{4231E599-4D2D-4C4C-9205-ABDF1782F5DB}"/>
-          </ac:spMkLst>
-        </pc:spChg>
-        <pc:spChg chg="add mod">
-          <ac:chgData name="David Stevens" userId="b6815b1ecc207c78" providerId="LiveId" clId="{B9A93E34-1E50-46C2-891E-93910431F02B}" dt="2018-06-01T13:26:28.253" v="1408" actId="122"/>
-          <ac:spMkLst>
-            <pc:docMk/>
-            <pc:sldMk cId="1114119429" sldId="260"/>
-            <ac:spMk id="12" creationId="{8FF0A0F7-3E8A-46D6-9385-D41D34CBF980}"/>
-          </ac:spMkLst>
-        </pc:spChg>
-        <pc:spChg chg="del topLvl">
-          <ac:chgData name="David Stevens" userId="b6815b1ecc207c78" providerId="LiveId" clId="{B9A93E34-1E50-46C2-891E-93910431F02B}" dt="2018-06-01T13:25:03.368" v="1129" actId="478"/>
-          <ac:spMkLst>
-            <pc:docMk/>
-            <pc:sldMk cId="1114119429" sldId="260"/>
-            <ac:spMk id="13" creationId="{055FD4D9-2754-42E4-B24F-29539DD0283C}"/>
-          </ac:spMkLst>
-        </pc:spChg>
-        <pc:spChg chg="del topLvl">
-          <ac:chgData name="David Stevens" userId="b6815b1ecc207c78" providerId="LiveId" clId="{B9A93E34-1E50-46C2-891E-93910431F02B}" dt="2018-06-01T13:24:57.541" v="1126" actId="478"/>
-          <ac:spMkLst>
-            <pc:docMk/>
-            <pc:sldMk cId="1114119429" sldId="260"/>
-            <ac:spMk id="14" creationId="{47917580-51F5-4C76-BA10-048E32672BAE}"/>
-          </ac:spMkLst>
-        </pc:spChg>
-        <pc:spChg chg="add del mod">
-          <ac:chgData name="David Stevens" userId="b6815b1ecc207c78" providerId="LiveId" clId="{B9A93E34-1E50-46C2-891E-93910431F02B}" dt="2018-06-01T13:26:46.923" v="1414" actId="478"/>
-          <ac:spMkLst>
-            <pc:docMk/>
-            <pc:sldMk cId="1114119429" sldId="260"/>
-            <ac:spMk id="17" creationId="{CA68A9DB-7C4A-4E16-9D92-716190E8E960}"/>
-          </ac:spMkLst>
-        </pc:spChg>
-        <pc:spChg chg="mod">
-          <ac:chgData name="David Stevens" userId="b6815b1ecc207c78" providerId="LiveId" clId="{B9A93E34-1E50-46C2-891E-93910431F02B}" dt="2018-06-01T14:11:40.822" v="1496" actId="122"/>
-          <ac:spMkLst>
-            <pc:docMk/>
-            <pc:sldMk cId="1114119429" sldId="260"/>
-            <ac:spMk id="19" creationId="{2D1068C2-BE85-4059-A918-9FDBE3279ABD}"/>
-          </ac:spMkLst>
-        </pc:spChg>
-        <pc:grpChg chg="del">
-          <ac:chgData name="David Stevens" userId="b6815b1ecc207c78" providerId="LiveId" clId="{B9A93E34-1E50-46C2-891E-93910431F02B}" dt="2018-06-01T13:24:57.541" v="1126" actId="478"/>
-          <ac:grpSpMkLst>
-            <pc:docMk/>
-            <pc:sldMk cId="1114119429" sldId="260"/>
-            <ac:grpSpMk id="15" creationId="{B17AA879-5022-495C-94A1-7D64DF899603}"/>
-          </ac:grpSpMkLst>
-        </pc:grpChg>
-        <pc:grpChg chg="add mod">
-          <ac:chgData name="David Stevens" userId="b6815b1ecc207c78" providerId="LiveId" clId="{B9A93E34-1E50-46C2-891E-93910431F02B}" dt="2018-06-01T13:26:50.556" v="1415" actId="1076"/>
-          <ac:grpSpMkLst>
-            <pc:docMk/>
-            <pc:sldMk cId="1114119429" sldId="260"/>
-            <ac:grpSpMk id="18" creationId="{C3AFE924-4BB6-40C2-AD76-B88F936F430B}"/>
-          </ac:grpSpMkLst>
-        </pc:grpChg>
-        <pc:picChg chg="add del mod">
-          <ac:chgData name="David Stevens" userId="b6815b1ecc207c78" providerId="LiveId" clId="{B9A93E34-1E50-46C2-891E-93910431F02B}" dt="2018-06-01T13:15:54.427" v="1078" actId="478"/>
-          <ac:picMkLst>
-            <pc:docMk/>
-            <pc:sldMk cId="1114119429" sldId="260"/>
-            <ac:picMk id="5" creationId="{8BF929A1-2850-4317-8497-73B94AE4994A}"/>
-          </ac:picMkLst>
-        </pc:picChg>
-        <pc:picChg chg="del">
-          <ac:chgData name="David Stevens" userId="b6815b1ecc207c78" providerId="LiveId" clId="{B9A93E34-1E50-46C2-891E-93910431F02B}" dt="2018-06-01T13:15:54.757" v="1079" actId="478"/>
-          <ac:picMkLst>
-            <pc:docMk/>
-            <pc:sldMk cId="1114119429" sldId="260"/>
-            <ac:picMk id="6" creationId="{DD850EBA-FCAE-48AE-8E26-5CD8A978232E}"/>
-          </ac:picMkLst>
-        </pc:picChg>
-        <pc:picChg chg="add del">
-          <ac:chgData name="David Stevens" userId="b6815b1ecc207c78" providerId="LiveId" clId="{B9A93E34-1E50-46C2-891E-93910431F02B}" dt="2018-06-01T13:16:53.180" v="1081" actId="478"/>
-          <ac:picMkLst>
-            <pc:docMk/>
-            <pc:sldMk cId="1114119429" sldId="260"/>
-            <ac:picMk id="7" creationId="{E9774F56-354E-4345-9BF2-E665AF189146}"/>
-          </ac:picMkLst>
-        </pc:picChg>
-        <pc:picChg chg="add mod">
-          <ac:chgData name="David Stevens" userId="b6815b1ecc207c78" providerId="LiveId" clId="{B9A93E34-1E50-46C2-891E-93910431F02B}" dt="2018-06-01T13:17:09.653" v="1085" actId="108"/>
-          <ac:picMkLst>
-            <pc:docMk/>
-            <pc:sldMk cId="1114119429" sldId="260"/>
-            <ac:picMk id="8" creationId="{B2D326CE-7789-45C3-9942-942F064F09C7}"/>
-          </ac:picMkLst>
-        </pc:picChg>
-        <pc:picChg chg="del">
-          <ac:chgData name="David Stevens" userId="b6815b1ecc207c78" providerId="LiveId" clId="{B9A93E34-1E50-46C2-891E-93910431F02B}" dt="2018-06-01T12:47:38.143" v="387" actId="478"/>
-          <ac:picMkLst>
-            <pc:docMk/>
-            <pc:sldMk cId="1114119429" sldId="260"/>
-            <ac:picMk id="9" creationId="{536D10C3-5CD5-49E7-B9C0-8C1E335A2F7C}"/>
-          </ac:picMkLst>
-        </pc:picChg>
-      </pc:sldChg>
-      <pc:sldChg chg="addSp delSp modSp">
-        <pc:chgData name="David Stevens" userId="b6815b1ecc207c78" providerId="LiveId" clId="{B9A93E34-1E50-46C2-891E-93910431F02B}" dt="2018-06-01T12:52:14.871" v="600" actId="20577"/>
-        <pc:sldMkLst>
-          <pc:docMk/>
-          <pc:sldMk cId="2058922302" sldId="261"/>
-        </pc:sldMkLst>
-        <pc:spChg chg="mod">
-          <ac:chgData name="David Stevens" userId="b6815b1ecc207c78" providerId="LiveId" clId="{B9A93E34-1E50-46C2-891E-93910431F02B}" dt="2018-06-01T12:50:43.417" v="449" actId="6549"/>
-          <ac:spMkLst>
-            <pc:docMk/>
-            <pc:sldMk cId="2058922302" sldId="261"/>
-            <ac:spMk id="3" creationId="{A5AF0DC5-393E-4548-933C-38216C80562D}"/>
-          </ac:spMkLst>
-        </pc:spChg>
-        <pc:spChg chg="mod">
-          <ac:chgData name="David Stevens" userId="b6815b1ecc207c78" providerId="LiveId" clId="{B9A93E34-1E50-46C2-891E-93910431F02B}" dt="2018-06-01T12:51:55.060" v="592" actId="20577"/>
-          <ac:spMkLst>
-            <pc:docMk/>
-            <pc:sldMk cId="2058922302" sldId="261"/>
-            <ac:spMk id="4" creationId="{BF44B7D7-EDE8-42AE-B4A7-52879D672463}"/>
-          </ac:spMkLst>
-        </pc:spChg>
-        <pc:spChg chg="add mod">
-          <ac:chgData name="David Stevens" userId="b6815b1ecc207c78" providerId="LiveId" clId="{B9A93E34-1E50-46C2-891E-93910431F02B}" dt="2018-06-01T12:52:11.238" v="597" actId="1582"/>
-          <ac:spMkLst>
-            <pc:docMk/>
-            <pc:sldMk cId="2058922302" sldId="261"/>
-            <ac:spMk id="8" creationId="{7114A4E8-438D-48DE-A80C-DF8841BAC7D0}"/>
-          </ac:spMkLst>
-        </pc:spChg>
-        <pc:spChg chg="add mod">
-          <ac:chgData name="David Stevens" userId="b6815b1ecc207c78" providerId="LiveId" clId="{B9A93E34-1E50-46C2-891E-93910431F02B}" dt="2018-06-01T12:52:14.871" v="600" actId="20577"/>
-          <ac:spMkLst>
-            <pc:docMk/>
-            <pc:sldMk cId="2058922302" sldId="261"/>
-            <ac:spMk id="10" creationId="{02C936AA-2268-45B8-8288-E2B88A1839F0}"/>
-          </ac:spMkLst>
-        </pc:spChg>
-        <pc:picChg chg="add mod">
-          <ac:chgData name="David Stevens" userId="b6815b1ecc207c78" providerId="LiveId" clId="{B9A93E34-1E50-46C2-891E-93910431F02B}" dt="2018-06-01T12:49:33.038" v="404" actId="12788"/>
-          <ac:picMkLst>
-            <pc:docMk/>
-            <pc:sldMk cId="2058922302" sldId="261"/>
-            <ac:picMk id="2" creationId="{8A718A99-25E6-4885-8D56-08DEC204B900}"/>
-          </ac:picMkLst>
-        </pc:picChg>
-        <pc:picChg chg="del">
-          <ac:chgData name="David Stevens" userId="b6815b1ecc207c78" providerId="LiveId" clId="{B9A93E34-1E50-46C2-891E-93910431F02B}" dt="2018-06-01T12:48:04.619" v="391" actId="478"/>
-          <ac:picMkLst>
-            <pc:docMk/>
-            <pc:sldMk cId="2058922302" sldId="261"/>
-            <ac:picMk id="5" creationId="{EEADC695-D0FA-4036-B20F-501B0D09347B}"/>
-          </ac:picMkLst>
-        </pc:picChg>
-        <pc:picChg chg="add mod">
-          <ac:chgData name="David Stevens" userId="b6815b1ecc207c78" providerId="LiveId" clId="{B9A93E34-1E50-46C2-891E-93910431F02B}" dt="2018-06-01T12:49:33.038" v="404" actId="12788"/>
-          <ac:picMkLst>
-            <pc:docMk/>
-            <pc:sldMk cId="2058922302" sldId="261"/>
-            <ac:picMk id="6" creationId="{F46933B3-A211-461B-A277-8B087AACF5D4}"/>
-          </ac:picMkLst>
-        </pc:picChg>
-        <pc:picChg chg="del">
-          <ac:chgData name="David Stevens" userId="b6815b1ecc207c78" providerId="LiveId" clId="{B9A93E34-1E50-46C2-891E-93910431F02B}" dt="2018-06-01T12:48:04.619" v="391" actId="478"/>
-          <ac:picMkLst>
-            <pc:docMk/>
-            <pc:sldMk cId="2058922302" sldId="261"/>
-            <ac:picMk id="9" creationId="{2588C389-81A6-4F25-A24B-837D86478970}"/>
-          </ac:picMkLst>
-        </pc:picChg>
-      </pc:sldChg>
-      <pc:sldChg chg="addSp delSp modSp">
-        <pc:chgData name="David Stevens" userId="b6815b1ecc207c78" providerId="LiveId" clId="{B9A93E34-1E50-46C2-891E-93910431F02B}" dt="2018-06-01T13:10:40.461" v="1026" actId="12"/>
-        <pc:sldMkLst>
-          <pc:docMk/>
-          <pc:sldMk cId="1449213109" sldId="262"/>
-        </pc:sldMkLst>
-        <pc:spChg chg="mod">
-          <ac:chgData name="David Stevens" userId="b6815b1ecc207c78" providerId="LiveId" clId="{B9A93E34-1E50-46C2-891E-93910431F02B}" dt="2018-06-01T13:03:34.321" v="818" actId="20577"/>
-          <ac:spMkLst>
-            <pc:docMk/>
-            <pc:sldMk cId="1449213109" sldId="262"/>
-            <ac:spMk id="3" creationId="{A5AF0DC5-393E-4548-933C-38216C80562D}"/>
-          </ac:spMkLst>
-        </pc:spChg>
-        <pc:spChg chg="mod">
-          <ac:chgData name="David Stevens" userId="b6815b1ecc207c78" providerId="LiveId" clId="{B9A93E34-1E50-46C2-891E-93910431F02B}" dt="2018-06-01T13:10:40.461" v="1026" actId="12"/>
-          <ac:spMkLst>
-            <pc:docMk/>
-            <pc:sldMk cId="1449213109" sldId="262"/>
-            <ac:spMk id="4" creationId="{BF44B7D7-EDE8-42AE-B4A7-52879D672463}"/>
-          </ac:spMkLst>
-        </pc:spChg>
-        <pc:picChg chg="add mod">
-          <ac:chgData name="David Stevens" userId="b6815b1ecc207c78" providerId="LiveId" clId="{B9A93E34-1E50-46C2-891E-93910431F02B}" dt="2018-06-01T13:10:12.962" v="985" actId="1076"/>
-          <ac:picMkLst>
-            <pc:docMk/>
-            <pc:sldMk cId="1449213109" sldId="262"/>
-            <ac:picMk id="2" creationId="{2A6A08F9-88FF-4FB8-B946-6B9BF42FBB6A}"/>
-          </ac:picMkLst>
-        </pc:picChg>
-        <pc:picChg chg="del">
-          <ac:chgData name="David Stevens" userId="b6815b1ecc207c78" providerId="LiveId" clId="{B9A93E34-1E50-46C2-891E-93910431F02B}" dt="2018-06-01T13:09:55.243" v="977" actId="478"/>
-          <ac:picMkLst>
-            <pc:docMk/>
-            <pc:sldMk cId="1449213109" sldId="262"/>
-            <ac:picMk id="5" creationId="{12734885-652F-47FE-8717-6840761DADFC}"/>
-          </ac:picMkLst>
-        </pc:picChg>
-        <pc:picChg chg="del">
-          <ac:chgData name="David Stevens" userId="b6815b1ecc207c78" providerId="LiveId" clId="{B9A93E34-1E50-46C2-891E-93910431F02B}" dt="2018-06-01T13:09:54.842" v="976" actId="478"/>
-          <ac:picMkLst>
-            <pc:docMk/>
-            <pc:sldMk cId="1449213109" sldId="262"/>
-            <ac:picMk id="6" creationId="{68786BD8-F996-4E77-8795-A92F86EEEDF6}"/>
-          </ac:picMkLst>
-        </pc:picChg>
-        <pc:picChg chg="del">
-          <ac:chgData name="David Stevens" userId="b6815b1ecc207c78" providerId="LiveId" clId="{B9A93E34-1E50-46C2-891E-93910431F02B}" dt="2018-06-01T13:09:59.150" v="980" actId="478"/>
-          <ac:picMkLst>
-            <pc:docMk/>
-            <pc:sldMk cId="1449213109" sldId="262"/>
-            <ac:picMk id="7" creationId="{69D0A8A0-6D6D-48BF-BE17-45992D7B2549}"/>
-          </ac:picMkLst>
-        </pc:picChg>
-      </pc:sldChg>
-      <pc:sldChg chg="addSp delSp modSp">
-        <pc:chgData name="David Stevens" userId="b6815b1ecc207c78" providerId="LiveId" clId="{B9A93E34-1E50-46C2-891E-93910431F02B}" dt="2018-06-01T12:40:35.689" v="156" actId="12788"/>
-        <pc:sldMkLst>
-          <pc:docMk/>
-          <pc:sldMk cId="718711563" sldId="270"/>
-        </pc:sldMkLst>
-        <pc:spChg chg="mod">
-          <ac:chgData name="David Stevens" userId="b6815b1ecc207c78" providerId="LiveId" clId="{B9A93E34-1E50-46C2-891E-93910431F02B}" dt="2018-06-01T12:39:57.903" v="154" actId="1076"/>
-          <ac:spMkLst>
-            <pc:docMk/>
-            <pc:sldMk cId="718711563" sldId="270"/>
-            <ac:spMk id="8" creationId="{709FF80F-F242-4DF4-8061-AC15887C5639}"/>
-          </ac:spMkLst>
-        </pc:spChg>
-        <pc:spChg chg="mod">
-          <ac:chgData name="David Stevens" userId="b6815b1ecc207c78" providerId="LiveId" clId="{B9A93E34-1E50-46C2-891E-93910431F02B}" dt="2018-06-01T12:40:34.049" v="155" actId="164"/>
-          <ac:spMkLst>
-            <pc:docMk/>
-            <pc:sldMk cId="718711563" sldId="270"/>
-            <ac:spMk id="12" creationId="{753E0F55-1470-4A65-9BFD-FD515A918534}"/>
-          </ac:spMkLst>
-        </pc:spChg>
-        <pc:spChg chg="add mod">
-          <ac:chgData name="David Stevens" userId="b6815b1ecc207c78" providerId="LiveId" clId="{B9A93E34-1E50-46C2-891E-93910431F02B}" dt="2018-06-01T12:39:29.176" v="144" actId="20577"/>
-          <ac:spMkLst>
-            <pc:docMk/>
-            <pc:sldMk cId="718711563" sldId="270"/>
-            <ac:spMk id="13" creationId="{63369EE8-62E2-4FCA-921E-928B409029E2}"/>
-          </ac:spMkLst>
-        </pc:spChg>
-        <pc:grpChg chg="add mod">
-          <ac:chgData name="David Stevens" userId="b6815b1ecc207c78" providerId="LiveId" clId="{B9A93E34-1E50-46C2-891E-93910431F02B}" dt="2018-06-01T12:40:35.689" v="156" actId="12788"/>
-          <ac:grpSpMkLst>
-            <pc:docMk/>
-            <pc:sldMk cId="718711563" sldId="270"/>
-            <ac:grpSpMk id="14" creationId="{363444BA-8878-4703-8C5C-2DF688FFC077}"/>
-          </ac:grpSpMkLst>
-        </pc:grpChg>
-        <pc:picChg chg="add mod">
-          <ac:chgData name="David Stevens" userId="b6815b1ecc207c78" providerId="LiveId" clId="{B9A93E34-1E50-46C2-891E-93910431F02B}" dt="2018-06-01T12:37:03.527" v="8" actId="1076"/>
-          <ac:picMkLst>
-            <pc:docMk/>
-            <pc:sldMk cId="718711563" sldId="270"/>
-            <ac:picMk id="4" creationId="{55AC0A1A-9F15-4DCB-BB69-F4D62965A07A}"/>
-          </ac:picMkLst>
-        </pc:picChg>
-        <pc:picChg chg="add del mod">
-          <ac:chgData name="David Stevens" userId="b6815b1ecc207c78" providerId="LiveId" clId="{B9A93E34-1E50-46C2-891E-93910431F02B}" dt="2018-06-01T12:38:08.576" v="33" actId="478"/>
-          <ac:picMkLst>
-            <pc:docMk/>
-            <pc:sldMk cId="718711563" sldId="270"/>
-            <ac:picMk id="6" creationId="{5B1740E5-C697-48F6-AD62-CDF7E6266831}"/>
-          </ac:picMkLst>
-        </pc:picChg>
-        <pc:picChg chg="mod">
-          <ac:chgData name="David Stevens" userId="b6815b1ecc207c78" providerId="LiveId" clId="{B9A93E34-1E50-46C2-891E-93910431F02B}" dt="2018-06-01T12:39:47.577" v="152" actId="108"/>
-          <ac:picMkLst>
-            <pc:docMk/>
-            <pc:sldMk cId="718711563" sldId="270"/>
-            <ac:picMk id="7" creationId="{78E571D0-D9E4-45DB-8E34-89438C34C91D}"/>
-          </ac:picMkLst>
-        </pc:picChg>
-        <pc:picChg chg="add mod">
-          <ac:chgData name="David Stevens" userId="b6815b1ecc207c78" providerId="LiveId" clId="{B9A93E34-1E50-46C2-891E-93910431F02B}" dt="2018-06-01T12:40:34.049" v="155" actId="164"/>
-          <ac:picMkLst>
-            <pc:docMk/>
-            <pc:sldMk cId="718711563" sldId="270"/>
-            <ac:picMk id="10" creationId="{215A5DE1-A490-4DE5-937A-3B574C55487A}"/>
-          </ac:picMkLst>
-        </pc:picChg>
-        <pc:picChg chg="del mod">
-          <ac:chgData name="David Stevens" userId="b6815b1ecc207c78" providerId="LiveId" clId="{B9A93E34-1E50-46C2-891E-93910431F02B}" dt="2018-06-01T12:37:40.736" v="27" actId="478"/>
-          <ac:picMkLst>
-            <pc:docMk/>
-            <pc:sldMk cId="718711563" sldId="270"/>
-            <ac:picMk id="11" creationId="{8E4C5643-43FD-4B2C-9446-2B1C0C385B63}"/>
-          </ac:picMkLst>
-        </pc:picChg>
-      </pc:sldChg>
-      <pc:sldChg chg="modSp add">
-        <pc:chgData name="David Stevens" userId="b6815b1ecc207c78" providerId="LiveId" clId="{B9A93E34-1E50-46C2-891E-93910431F02B}" dt="2018-06-01T13:11:00.074" v="1049" actId="20577"/>
-        <pc:sldMkLst>
-          <pc:docMk/>
-          <pc:sldMk cId="967135108" sldId="272"/>
-        </pc:sldMkLst>
-        <pc:spChg chg="mod">
-          <ac:chgData name="David Stevens" userId="b6815b1ecc207c78" providerId="LiveId" clId="{B9A93E34-1E50-46C2-891E-93910431F02B}" dt="2018-06-01T13:11:00.074" v="1049" actId="20577"/>
-          <ac:spMkLst>
-            <pc:docMk/>
-            <pc:sldMk cId="967135108" sldId="272"/>
-            <ac:spMk id="4" creationId="{BF44B7D7-EDE8-42AE-B4A7-52879D672463}"/>
-          </ac:spMkLst>
-        </pc:spChg>
-      </pc:sldChg>
-      <pc:sldChg chg="add">
-        <pc:chgData name="David Stevens" userId="b6815b1ecc207c78" providerId="LiveId" clId="{B9A93E34-1E50-46C2-891E-93910431F02B}" dt="2018-06-01T13:15:36.251" v="1050" actId="122"/>
-        <pc:sldMkLst>
-          <pc:docMk/>
-          <pc:sldMk cId="1791255816" sldId="273"/>
-        </pc:sldMkLst>
-      </pc:sldChg>
-    </pc:docChg>
   </pc:docChgLst>
   <pc:docChgLst>
     <pc:chgData name="Stevens, David" userId="ac0626e3-72c9-46ef-be9c-68c7f11863b4" providerId="ADAL" clId="{A8C0114A-9B02-496F-AA17-2C0DCF61E1CD}"/>
@@ -928,7 +408,7 @@
                 <a:latin typeface="Arial"/>
                 <a:cs typeface="Arial"/>
               </a:rPr>
-              <a:t>6/7/2018</a:t>
+              <a:t>11/15/2018</a:t>
             </a:fld>
             <a:endParaRPr lang="en-US">
               <a:latin typeface="Arial"/>
@@ -1113,7 +593,7 @@
             <a:fld id="{73B26A0F-F4D6-9B4F-A87B-D8948CDE3BB4}" type="datetimeFigureOut">
               <a:rPr lang="en-US" smtClean="0"/>
               <a:pPr/>
-              <a:t>6/7/2018</a:t>
+              <a:t>11/15/2018</a:t>
             </a:fld>
             <a:endParaRPr lang="en-US"/>
           </a:p>
@@ -2757,7 +2237,7 @@
                   <a:spcPts val="0"/>
                 </a:spcBef>
               </a:pPr>
-              <a:t>June 7, 2018</a:t>
+              <a:t>November 15, 2018</a:t>
             </a:fld>
             <a:endParaRPr lang="en-US" sz="1400" b="0" dirty="0">
               <a:solidFill>
@@ -4560,7 +4040,7 @@
                   <a:spcPct val="50000"/>
                 </a:spcBef>
               </a:pPr>
-              <a:t>June 7, 2018</a:t>
+              <a:t>November 15, 2018</a:t>
             </a:fld>
             <a:endParaRPr lang="en-US" sz="1100" b="0" dirty="0">
               <a:solidFill>
@@ -6313,7 +5793,7 @@
                   <a:spcPct val="50000"/>
                 </a:spcBef>
               </a:pPr>
-              <a:t>June 7, 2018</a:t>
+              <a:t>November 15, 2018</a:t>
             </a:fld>
             <a:endParaRPr lang="en-US" sz="1100" b="0" dirty="0">
               <a:solidFill>
@@ -7784,7 +7264,7 @@
                   <a:spcPct val="50000"/>
                 </a:spcBef>
               </a:pPr>
-              <a:t>June 7, 2018</a:t>
+              <a:t>November 15, 2018</a:t>
             </a:fld>
             <a:endParaRPr lang="en-US" sz="1100" b="0" dirty="0">
               <a:solidFill>
@@ -9137,7 +8617,7 @@
                   <a:spcPts val="0"/>
                 </a:spcBef>
               </a:pPr>
-              <a:t>June 7, 2018</a:t>
+              <a:t>November 15, 2018</a:t>
             </a:fld>
             <a:endParaRPr lang="en-US" sz="1100" b="0" dirty="0">
               <a:solidFill>
@@ -10574,7 +10054,7 @@
                   <a:spcPct val="50000"/>
                 </a:spcBef>
               </a:pPr>
-              <a:t>June 7, 2018</a:t>
+              <a:t>November 15, 2018</a:t>
             </a:fld>
             <a:endParaRPr lang="en-US" sz="1100" b="0" dirty="0">
               <a:solidFill>
@@ -13475,7 +12955,7 @@
                   <a:spcPts val="0"/>
                 </a:spcBef>
               </a:pPr>
-              <a:t>June 7, 2018</a:t>
+              <a:t>November 15, 2018</a:t>
             </a:fld>
             <a:endParaRPr lang="en-US" sz="1400" b="0" dirty="0">
               <a:solidFill>
@@ -14866,7 +14346,7 @@
                   <a:spcPts val="0"/>
                 </a:spcBef>
               </a:pPr>
-              <a:t>June 7, 2018</a:t>
+              <a:t>November 15, 2018</a:t>
             </a:fld>
             <a:endParaRPr lang="en-US" sz="1400" b="0" dirty="0">
               <a:solidFill>
@@ -16427,7 +15907,7 @@
                   <a:spcPts val="0"/>
                 </a:spcBef>
               </a:pPr>
-              <a:t>June 7, 2018</a:t>
+              <a:t>November 15, 2018</a:t>
             </a:fld>
             <a:endParaRPr lang="en-US" sz="1400" b="0" dirty="0">
               <a:solidFill>
@@ -17849,7 +17329,7 @@
                   <a:spcPts val="0"/>
                 </a:spcBef>
               </a:pPr>
-              <a:t>June 7, 2018</a:t>
+              <a:t>November 15, 2018</a:t>
             </a:fld>
             <a:endParaRPr lang="en-US" sz="1400" b="0" dirty="0">
               <a:solidFill>
@@ -19263,7 +18743,7 @@
                   <a:spcPts val="0"/>
                 </a:spcBef>
               </a:pPr>
-              <a:t>June 7, 2018</a:t>
+              <a:t>November 15, 2018</a:t>
             </a:fld>
             <a:endParaRPr lang="en-US" sz="1400" b="0" dirty="0">
               <a:solidFill>
@@ -21011,7 +20491,7 @@
                   <a:spcPts val="0"/>
                 </a:spcBef>
               </a:pPr>
-              <a:t>June 7, 2018</a:t>
+              <a:t>November 15, 2018</a:t>
             </a:fld>
             <a:endParaRPr lang="en-US" sz="1100" b="0" dirty="0">
               <a:solidFill>
@@ -23017,7 +22497,809 @@
             </a:br>
             <a:r>
               <a:rPr lang="en-GB" sz="2400" dirty="0"/>
-              <a:t>Page 2 - Motivations</a:t>
+              <a:t>Page 2</a:t>
+            </a:r>
+          </a:p>
+        </p:txBody>
+      </p:sp>
+      <p:graphicFrame>
+        <p:nvGraphicFramePr>
+          <p:cNvPr id="4" name="Content Placeholder 3">
+            <a:extLst>
+              <a:ext uri="{FF2B5EF4-FFF2-40B4-BE49-F238E27FC236}">
+                <a16:creationId xmlns:a16="http://schemas.microsoft.com/office/drawing/2014/main" id="{8859AE11-1258-4695-8E3B-F6DEC684EAE0}"/>
+              </a:ext>
+            </a:extLst>
+          </p:cNvPr>
+          <p:cNvGraphicFramePr>
+            <a:graphicFrameLocks noGrp="1"/>
+          </p:cNvGraphicFramePr>
+          <p:nvPr>
+            <p:ph idx="1"/>
+            <p:extLst>
+              <p:ext uri="{D42A27DB-BD31-4B8C-83A1-F6EECF244321}">
+                <p14:modId xmlns:p14="http://schemas.microsoft.com/office/powerpoint/2010/main" val="849829020"/>
+              </p:ext>
+            </p:extLst>
+          </p:nvPr>
+        </p:nvGraphicFramePr>
+        <p:xfrm>
+          <a:off x="685800" y="1466153"/>
+          <a:ext cx="13258760" cy="4258175"/>
+        </p:xfrm>
+        <a:graphic>
+          <a:graphicData uri="http://schemas.openxmlformats.org/drawingml/2006/table">
+            <a:tbl>
+              <a:tblPr firstRow="1" bandRow="1">
+                <a:tableStyleId>{45BD5076-5073-49C7-9E08-65982F3C9860}</a:tableStyleId>
+              </a:tblPr>
+              <a:tblGrid>
+                <a:gridCol w="1898152">
+                  <a:extLst>
+                    <a:ext uri="{9D8B030D-6E8A-4147-A177-3AD203B41FA5}">
+                      <a16:colId xmlns:a16="http://schemas.microsoft.com/office/drawing/2014/main" val="1652976833"/>
+                    </a:ext>
+                  </a:extLst>
+                </a:gridCol>
+                <a:gridCol w="11360608">
+                  <a:extLst>
+                    <a:ext uri="{9D8B030D-6E8A-4147-A177-3AD203B41FA5}">
+                      <a16:colId xmlns:a16="http://schemas.microsoft.com/office/drawing/2014/main" val="2728226356"/>
+                    </a:ext>
+                  </a:extLst>
+                </a:gridCol>
+              </a:tblGrid>
+              <a:tr h="938744">
+                <a:tc>
+                  <a:txBody>
+                    <a:bodyPr/>
+                    <a:lstStyle/>
+                    <a:p>
+                      <a:r>
+                        <a:rPr lang="en-GB" sz="1400" b="1" dirty="0"/>
+                        <a:t>Business Value</a:t>
+                      </a:r>
+                      <a:endParaRPr lang="en-GB" sz="1400" b="1" dirty="0">
+                        <a:solidFill>
+                          <a:srgbClr val="FF0000"/>
+                        </a:solidFill>
+                      </a:endParaRPr>
+                    </a:p>
+                  </a:txBody>
+                  <a:tcPr>
+                    <a:lnL w="12700" cap="flat" cmpd="sng" algn="ctr">
+                      <a:solidFill>
+                        <a:schemeClr val="tx1"/>
+                      </a:solidFill>
+                      <a:prstDash val="solid"/>
+                      <a:round/>
+                      <a:headEnd type="none" w="med" len="med"/>
+                      <a:tailEnd type="none" w="med" len="med"/>
+                    </a:lnL>
+                    <a:lnR w="12700" cap="flat" cmpd="sng" algn="ctr">
+                      <a:solidFill>
+                        <a:schemeClr val="tx1"/>
+                      </a:solidFill>
+                      <a:prstDash val="solid"/>
+                      <a:round/>
+                      <a:headEnd type="none" w="med" len="med"/>
+                      <a:tailEnd type="none" w="med" len="med"/>
+                    </a:lnR>
+                    <a:lnT w="12700" cap="flat" cmpd="sng" algn="ctr">
+                      <a:solidFill>
+                        <a:schemeClr val="tx1"/>
+                      </a:solidFill>
+                      <a:prstDash val="solid"/>
+                      <a:round/>
+                      <a:headEnd type="none" w="med" len="med"/>
+                      <a:tailEnd type="none" w="med" len="med"/>
+                    </a:lnT>
+                    <a:lnB w="12700" cap="flat" cmpd="sng" algn="ctr">
+                      <a:solidFill>
+                        <a:schemeClr val="tx1"/>
+                      </a:solidFill>
+                      <a:prstDash val="solid"/>
+                      <a:round/>
+                      <a:headEnd type="none" w="med" len="med"/>
+                      <a:tailEnd type="none" w="med" len="med"/>
+                    </a:lnB>
+                    <a:lnTlToBr w="12700" cmpd="sng">
+                      <a:noFill/>
+                      <a:prstDash val="solid"/>
+                    </a:lnTlToBr>
+                    <a:lnBlToTr w="12700" cmpd="sng">
+                      <a:noFill/>
+                      <a:prstDash val="solid"/>
+                    </a:lnBlToTr>
+                    <a:solidFill>
+                      <a:schemeClr val="bg1">
+                        <a:lumMod val="85000"/>
+                      </a:schemeClr>
+                    </a:solidFill>
+                  </a:tcPr>
+                </a:tc>
+                <a:tc>
+                  <a:txBody>
+                    <a:bodyPr/>
+                    <a:lstStyle/>
+                    <a:p>
+                      <a:endParaRPr lang="en-GB" sz="1400" dirty="0"/>
+                    </a:p>
+                  </a:txBody>
+                  <a:tcPr>
+                    <a:lnL w="12700" cap="flat" cmpd="sng" algn="ctr">
+                      <a:solidFill>
+                        <a:schemeClr val="tx1"/>
+                      </a:solidFill>
+                      <a:prstDash val="solid"/>
+                      <a:round/>
+                      <a:headEnd type="none" w="med" len="med"/>
+                      <a:tailEnd type="none" w="med" len="med"/>
+                    </a:lnL>
+                    <a:lnR w="12700" cap="flat" cmpd="sng" algn="ctr">
+                      <a:solidFill>
+                        <a:schemeClr val="tx1"/>
+                      </a:solidFill>
+                      <a:prstDash val="solid"/>
+                      <a:round/>
+                      <a:headEnd type="none" w="med" len="med"/>
+                      <a:tailEnd type="none" w="med" len="med"/>
+                    </a:lnR>
+                    <a:lnT w="12700" cap="flat" cmpd="sng" algn="ctr">
+                      <a:solidFill>
+                        <a:schemeClr val="tx1"/>
+                      </a:solidFill>
+                      <a:prstDash val="solid"/>
+                      <a:round/>
+                      <a:headEnd type="none" w="med" len="med"/>
+                      <a:tailEnd type="none" w="med" len="med"/>
+                    </a:lnT>
+                    <a:lnB w="12700" cap="flat" cmpd="sng" algn="ctr">
+                      <a:solidFill>
+                        <a:schemeClr val="tx1"/>
+                      </a:solidFill>
+                      <a:prstDash val="solid"/>
+                      <a:round/>
+                      <a:headEnd type="none" w="med" len="med"/>
+                      <a:tailEnd type="none" w="med" len="med"/>
+                    </a:lnB>
+                    <a:lnTlToBr w="12700" cmpd="sng">
+                      <a:noFill/>
+                      <a:prstDash val="solid"/>
+                    </a:lnTlToBr>
+                    <a:lnBlToTr w="12700" cmpd="sng">
+                      <a:noFill/>
+                      <a:prstDash val="solid"/>
+                    </a:lnBlToTr>
+                    <a:solidFill>
+                      <a:schemeClr val="bg1"/>
+                    </a:solidFill>
+                  </a:tcPr>
+                </a:tc>
+                <a:extLst>
+                  <a:ext uri="{0D108BD9-81ED-4DB2-BD59-A6C34878D82A}">
+                    <a16:rowId xmlns:a16="http://schemas.microsoft.com/office/drawing/2014/main" val="706893524"/>
+                  </a:ext>
+                </a:extLst>
+              </a:tr>
+              <a:tr h="1594246">
+                <a:tc>
+                  <a:txBody>
+                    <a:bodyPr/>
+                    <a:lstStyle/>
+                    <a:p>
+                      <a:r>
+                        <a:rPr lang="en-GB" sz="1400" b="1" dirty="0"/>
+                        <a:t>Technical Value</a:t>
+                      </a:r>
+                    </a:p>
+                  </a:txBody>
+                  <a:tcPr>
+                    <a:lnL w="12700" cap="flat" cmpd="sng" algn="ctr">
+                      <a:solidFill>
+                        <a:schemeClr val="tx1"/>
+                      </a:solidFill>
+                      <a:prstDash val="solid"/>
+                      <a:round/>
+                      <a:headEnd type="none" w="med" len="med"/>
+                      <a:tailEnd type="none" w="med" len="med"/>
+                    </a:lnL>
+                    <a:lnR w="12700" cap="flat" cmpd="sng" algn="ctr">
+                      <a:solidFill>
+                        <a:schemeClr val="tx1"/>
+                      </a:solidFill>
+                      <a:prstDash val="solid"/>
+                      <a:round/>
+                      <a:headEnd type="none" w="med" len="med"/>
+                      <a:tailEnd type="none" w="med" len="med"/>
+                    </a:lnR>
+                    <a:lnT w="12700" cap="flat" cmpd="sng" algn="ctr">
+                      <a:solidFill>
+                        <a:schemeClr val="tx1"/>
+                      </a:solidFill>
+                      <a:prstDash val="solid"/>
+                      <a:round/>
+                      <a:headEnd type="none" w="med" len="med"/>
+                      <a:tailEnd type="none" w="med" len="med"/>
+                    </a:lnT>
+                    <a:lnB w="12700" cap="flat" cmpd="sng" algn="ctr">
+                      <a:solidFill>
+                        <a:schemeClr val="tx1"/>
+                      </a:solidFill>
+                      <a:prstDash val="solid"/>
+                      <a:round/>
+                      <a:headEnd type="none" w="med" len="med"/>
+                      <a:tailEnd type="none" w="med" len="med"/>
+                    </a:lnB>
+                    <a:lnTlToBr w="12700" cmpd="sng">
+                      <a:noFill/>
+                      <a:prstDash val="solid"/>
+                    </a:lnTlToBr>
+                    <a:lnBlToTr w="12700" cmpd="sng">
+                      <a:noFill/>
+                      <a:prstDash val="solid"/>
+                    </a:lnBlToTr>
+                    <a:solidFill>
+                      <a:schemeClr val="bg1">
+                        <a:lumMod val="85000"/>
+                      </a:schemeClr>
+                    </a:solidFill>
+                  </a:tcPr>
+                </a:tc>
+                <a:tc>
+                  <a:txBody>
+                    <a:bodyPr/>
+                    <a:lstStyle/>
+                    <a:p>
+                      <a:endParaRPr lang="en-GB" sz="1400" dirty="0"/>
+                    </a:p>
+                  </a:txBody>
+                  <a:tcPr>
+                    <a:lnL w="12700" cap="flat" cmpd="sng" algn="ctr">
+                      <a:solidFill>
+                        <a:schemeClr val="tx1"/>
+                      </a:solidFill>
+                      <a:prstDash val="solid"/>
+                      <a:round/>
+                      <a:headEnd type="none" w="med" len="med"/>
+                      <a:tailEnd type="none" w="med" len="med"/>
+                    </a:lnL>
+                    <a:lnR w="12700" cap="flat" cmpd="sng" algn="ctr">
+                      <a:solidFill>
+                        <a:schemeClr val="tx1"/>
+                      </a:solidFill>
+                      <a:prstDash val="solid"/>
+                      <a:round/>
+                      <a:headEnd type="none" w="med" len="med"/>
+                      <a:tailEnd type="none" w="med" len="med"/>
+                    </a:lnR>
+                    <a:lnT w="12700" cap="flat" cmpd="sng" algn="ctr">
+                      <a:solidFill>
+                        <a:schemeClr val="tx1"/>
+                      </a:solidFill>
+                      <a:prstDash val="solid"/>
+                      <a:round/>
+                      <a:headEnd type="none" w="med" len="med"/>
+                      <a:tailEnd type="none" w="med" len="med"/>
+                    </a:lnT>
+                    <a:lnB w="12700" cap="flat" cmpd="sng" algn="ctr">
+                      <a:solidFill>
+                        <a:schemeClr val="tx1"/>
+                      </a:solidFill>
+                      <a:prstDash val="solid"/>
+                      <a:round/>
+                      <a:headEnd type="none" w="med" len="med"/>
+                      <a:tailEnd type="none" w="med" len="med"/>
+                    </a:lnB>
+                    <a:lnTlToBr w="12700" cmpd="sng">
+                      <a:noFill/>
+                      <a:prstDash val="solid"/>
+                    </a:lnTlToBr>
+                    <a:lnBlToTr w="12700" cmpd="sng">
+                      <a:noFill/>
+                      <a:prstDash val="solid"/>
+                    </a:lnBlToTr>
+                  </a:tcPr>
+                </a:tc>
+                <a:extLst>
+                  <a:ext uri="{0D108BD9-81ED-4DB2-BD59-A6C34878D82A}">
+                    <a16:rowId xmlns:a16="http://schemas.microsoft.com/office/drawing/2014/main" val="931816822"/>
+                  </a:ext>
+                </a:extLst>
+              </a:tr>
+              <a:tr h="1725185">
+                <a:tc>
+                  <a:txBody>
+                    <a:bodyPr/>
+                    <a:lstStyle/>
+                    <a:p>
+                      <a:r>
+                        <a:rPr lang="en-GB" sz="1400" b="1"/>
+                        <a:t>Client Testimonial </a:t>
+                      </a:r>
+                      <a:endParaRPr lang="en-GB" sz="1400" b="1" dirty="0"/>
+                    </a:p>
+                  </a:txBody>
+                  <a:tcPr>
+                    <a:lnL w="12700" cap="flat" cmpd="sng" algn="ctr">
+                      <a:solidFill>
+                        <a:schemeClr val="tx1"/>
+                      </a:solidFill>
+                      <a:prstDash val="solid"/>
+                      <a:round/>
+                      <a:headEnd type="none" w="med" len="med"/>
+                      <a:tailEnd type="none" w="med" len="med"/>
+                    </a:lnL>
+                    <a:lnR w="12700" cap="flat" cmpd="sng" algn="ctr">
+                      <a:solidFill>
+                        <a:schemeClr val="tx1"/>
+                      </a:solidFill>
+                      <a:prstDash val="solid"/>
+                      <a:round/>
+                      <a:headEnd type="none" w="med" len="med"/>
+                      <a:tailEnd type="none" w="med" len="med"/>
+                    </a:lnR>
+                    <a:lnT w="12700" cap="flat" cmpd="sng" algn="ctr">
+                      <a:solidFill>
+                        <a:schemeClr val="tx1"/>
+                      </a:solidFill>
+                      <a:prstDash val="solid"/>
+                      <a:round/>
+                      <a:headEnd type="none" w="med" len="med"/>
+                      <a:tailEnd type="none" w="med" len="med"/>
+                    </a:lnT>
+                    <a:lnB w="12700" cap="flat" cmpd="sng" algn="ctr">
+                      <a:solidFill>
+                        <a:schemeClr val="tx1"/>
+                      </a:solidFill>
+                      <a:prstDash val="solid"/>
+                      <a:round/>
+                      <a:headEnd type="none" w="med" len="med"/>
+                      <a:tailEnd type="none" w="med" len="med"/>
+                    </a:lnB>
+                    <a:lnTlToBr w="12700" cmpd="sng">
+                      <a:noFill/>
+                      <a:prstDash val="solid"/>
+                    </a:lnTlToBr>
+                    <a:lnBlToTr w="12700" cmpd="sng">
+                      <a:noFill/>
+                      <a:prstDash val="solid"/>
+                    </a:lnBlToTr>
+                    <a:solidFill>
+                      <a:schemeClr val="bg1">
+                        <a:lumMod val="85000"/>
+                      </a:schemeClr>
+                    </a:solidFill>
+                  </a:tcPr>
+                </a:tc>
+                <a:tc>
+                  <a:txBody>
+                    <a:bodyPr/>
+                    <a:lstStyle/>
+                    <a:p>
+                      <a:endParaRPr lang="en-GB" sz="1400" dirty="0"/>
+                    </a:p>
+                  </a:txBody>
+                  <a:tcPr>
+                    <a:lnL w="12700" cap="flat" cmpd="sng" algn="ctr">
+                      <a:solidFill>
+                        <a:schemeClr val="tx1"/>
+                      </a:solidFill>
+                      <a:prstDash val="solid"/>
+                      <a:round/>
+                      <a:headEnd type="none" w="med" len="med"/>
+                      <a:tailEnd type="none" w="med" len="med"/>
+                    </a:lnL>
+                    <a:lnR w="12700" cap="flat" cmpd="sng" algn="ctr">
+                      <a:solidFill>
+                        <a:schemeClr val="tx1"/>
+                      </a:solidFill>
+                      <a:prstDash val="solid"/>
+                      <a:round/>
+                      <a:headEnd type="none" w="med" len="med"/>
+                      <a:tailEnd type="none" w="med" len="med"/>
+                    </a:lnR>
+                    <a:lnT w="12700" cap="flat" cmpd="sng" algn="ctr">
+                      <a:solidFill>
+                        <a:schemeClr val="tx1"/>
+                      </a:solidFill>
+                      <a:prstDash val="solid"/>
+                      <a:round/>
+                      <a:headEnd type="none" w="med" len="med"/>
+                      <a:tailEnd type="none" w="med" len="med"/>
+                    </a:lnT>
+                    <a:lnB w="12700" cap="flat" cmpd="sng" algn="ctr">
+                      <a:solidFill>
+                        <a:schemeClr val="tx1"/>
+                      </a:solidFill>
+                      <a:prstDash val="solid"/>
+                      <a:round/>
+                      <a:headEnd type="none" w="med" len="med"/>
+                      <a:tailEnd type="none" w="med" len="med"/>
+                    </a:lnB>
+                    <a:lnTlToBr w="12700" cmpd="sng">
+                      <a:noFill/>
+                      <a:prstDash val="solid"/>
+                    </a:lnTlToBr>
+                    <a:lnBlToTr w="12700" cmpd="sng">
+                      <a:noFill/>
+                      <a:prstDash val="solid"/>
+                    </a:lnBlToTr>
+                  </a:tcPr>
+                </a:tc>
+                <a:extLst>
+                  <a:ext uri="{0D108BD9-81ED-4DB2-BD59-A6C34878D82A}">
+                    <a16:rowId xmlns:a16="http://schemas.microsoft.com/office/drawing/2014/main" val="3864891822"/>
+                  </a:ext>
+                </a:extLst>
+              </a:tr>
+            </a:tbl>
+          </a:graphicData>
+        </a:graphic>
+      </p:graphicFrame>
+      <p:sp>
+        <p:nvSpPr>
+          <p:cNvPr id="9" name="Rectangle 8">
+            <a:extLst>
+              <a:ext uri="{FF2B5EF4-FFF2-40B4-BE49-F238E27FC236}">
+                <a16:creationId xmlns:a16="http://schemas.microsoft.com/office/drawing/2014/main" id="{F51BD94C-6E2C-449C-98C0-21544A2B0FCE}"/>
+              </a:ext>
+            </a:extLst>
+          </p:cNvPr>
+          <p:cNvSpPr/>
+          <p:nvPr/>
+        </p:nvSpPr>
+        <p:spPr>
+          <a:xfrm>
+            <a:off x="12169777" y="7128172"/>
+            <a:ext cx="1984839" cy="276999"/>
+          </a:xfrm>
+          <a:prstGeom prst="rect">
+            <a:avLst/>
+          </a:prstGeom>
+        </p:spPr>
+        <p:txBody>
+          <a:bodyPr wrap="none">
+            <a:spAutoFit/>
+          </a:bodyPr>
+          <a:lstStyle/>
+          <a:p>
+            <a:r>
+              <a:rPr lang="en-GB" sz="1200" dirty="0"/>
+              <a:t>** Delete as appropriate    </a:t>
+            </a:r>
+          </a:p>
+        </p:txBody>
+      </p:sp>
+      <p:sp>
+        <p:nvSpPr>
+          <p:cNvPr id="10" name="TextBox 9">
+            <a:extLst>
+              <a:ext uri="{FF2B5EF4-FFF2-40B4-BE49-F238E27FC236}">
+                <a16:creationId xmlns:a16="http://schemas.microsoft.com/office/drawing/2014/main" id="{62EB0FB2-6691-4E10-9A68-21BE7B2B3E69}"/>
+              </a:ext>
+            </a:extLst>
+          </p:cNvPr>
+          <p:cNvSpPr txBox="1"/>
+          <p:nvPr/>
+        </p:nvSpPr>
+        <p:spPr>
+          <a:xfrm>
+            <a:off x="6019056" y="247360"/>
+            <a:ext cx="8135560" cy="369332"/>
+          </a:xfrm>
+          <a:prstGeom prst="rect">
+            <a:avLst/>
+          </a:prstGeom>
+          <a:noFill/>
+        </p:spPr>
+        <p:txBody>
+          <a:bodyPr wrap="none" rtlCol="0">
+            <a:spAutoFit/>
+          </a:bodyPr>
+          <a:lstStyle/>
+          <a:p>
+            <a:r>
+              <a:rPr lang="en-GB" sz="1800" b="1" dirty="0">
+                <a:solidFill>
+                  <a:srgbClr val="FF0000"/>
+                </a:solidFill>
+              </a:rPr>
+              <a:t>Please attach any supporting media, videos, docs, images (files or links)</a:t>
+            </a:r>
+          </a:p>
+        </p:txBody>
+      </p:sp>
+      <p:sp>
+        <p:nvSpPr>
+          <p:cNvPr id="6" name="TextBox 5">
+            <a:extLst>
+              <a:ext uri="{FF2B5EF4-FFF2-40B4-BE49-F238E27FC236}">
+                <a16:creationId xmlns:a16="http://schemas.microsoft.com/office/drawing/2014/main" id="{68155034-7E78-4111-B778-83516045DAE5}"/>
+              </a:ext>
+            </a:extLst>
+          </p:cNvPr>
+          <p:cNvSpPr txBox="1"/>
+          <p:nvPr/>
+        </p:nvSpPr>
+        <p:spPr>
+          <a:xfrm>
+            <a:off x="618688" y="7035839"/>
+            <a:ext cx="1338828" cy="369332"/>
+          </a:xfrm>
+          <a:prstGeom prst="rect">
+            <a:avLst/>
+          </a:prstGeom>
+          <a:noFill/>
+        </p:spPr>
+        <p:txBody>
+          <a:bodyPr wrap="none" rtlCol="0">
+            <a:spAutoFit/>
+          </a:bodyPr>
+          <a:lstStyle/>
+          <a:p>
+            <a:r>
+              <a:rPr lang="en-GB" sz="1800" b="1" dirty="0"/>
+              <a:t>* Required</a:t>
+            </a:r>
+          </a:p>
+        </p:txBody>
+      </p:sp>
+      <p:graphicFrame>
+        <p:nvGraphicFramePr>
+          <p:cNvPr id="7" name="Table 6">
+            <a:extLst>
+              <a:ext uri="{FF2B5EF4-FFF2-40B4-BE49-F238E27FC236}">
+                <a16:creationId xmlns:a16="http://schemas.microsoft.com/office/drawing/2014/main" id="{4E3218CD-0420-4A7D-A8A2-EC1E63321C78}"/>
+              </a:ext>
+            </a:extLst>
+          </p:cNvPr>
+          <p:cNvGraphicFramePr>
+            <a:graphicFrameLocks noGrp="1"/>
+          </p:cNvGraphicFramePr>
+          <p:nvPr>
+            <p:extLst>
+              <p:ext uri="{D42A27DB-BD31-4B8C-83A1-F6EECF244321}">
+                <p14:modId xmlns:p14="http://schemas.microsoft.com/office/powerpoint/2010/main" val="1498150247"/>
+              </p:ext>
+            </p:extLst>
+          </p:nvPr>
+        </p:nvGraphicFramePr>
+        <p:xfrm>
+          <a:off x="697302" y="6055410"/>
+          <a:ext cx="13247257" cy="741680"/>
+        </p:xfrm>
+        <a:graphic>
+          <a:graphicData uri="http://schemas.openxmlformats.org/drawingml/2006/table">
+            <a:tbl>
+              <a:tblPr firstRow="1" bandRow="1">
+                <a:tableStyleId>{45BD5076-5073-49C7-9E08-65982F3C9860}</a:tableStyleId>
+              </a:tblPr>
+              <a:tblGrid>
+                <a:gridCol w="13247257">
+                  <a:extLst>
+                    <a:ext uri="{9D8B030D-6E8A-4147-A177-3AD203B41FA5}">
+                      <a16:colId xmlns:a16="http://schemas.microsoft.com/office/drawing/2014/main" val="2425050337"/>
+                    </a:ext>
+                  </a:extLst>
+                </a:gridCol>
+              </a:tblGrid>
+              <a:tr h="370840">
+                <a:tc>
+                  <a:txBody>
+                    <a:bodyPr/>
+                    <a:lstStyle/>
+                    <a:p>
+                      <a:r>
+                        <a:rPr lang="en-GB" sz="1400" dirty="0"/>
+                        <a:t>Delivery </a:t>
+                      </a:r>
+                      <a:r>
+                        <a:rPr lang="en-GB" sz="1400" dirty="0" err="1"/>
+                        <a:t>Centers</a:t>
+                      </a:r>
+                      <a:r>
+                        <a:rPr lang="en-GB" sz="1400" dirty="0"/>
+                        <a:t> details</a:t>
+                      </a:r>
+                    </a:p>
+                  </a:txBody>
+                  <a:tcPr>
+                    <a:lnL w="12700" cap="flat" cmpd="sng" algn="ctr">
+                      <a:solidFill>
+                        <a:schemeClr val="tx1"/>
+                      </a:solidFill>
+                      <a:prstDash val="solid"/>
+                      <a:round/>
+                      <a:headEnd type="none" w="med" len="med"/>
+                      <a:tailEnd type="none" w="med" len="med"/>
+                    </a:lnL>
+                    <a:lnR w="12700" cap="flat" cmpd="sng" algn="ctr">
+                      <a:solidFill>
+                        <a:schemeClr val="tx1"/>
+                      </a:solidFill>
+                      <a:prstDash val="solid"/>
+                      <a:round/>
+                      <a:headEnd type="none" w="med" len="med"/>
+                      <a:tailEnd type="none" w="med" len="med"/>
+                    </a:lnR>
+                    <a:lnT w="12700" cap="flat" cmpd="sng" algn="ctr">
+                      <a:solidFill>
+                        <a:schemeClr val="tx1"/>
+                      </a:solidFill>
+                      <a:prstDash val="solid"/>
+                      <a:round/>
+                      <a:headEnd type="none" w="med" len="med"/>
+                      <a:tailEnd type="none" w="med" len="med"/>
+                    </a:lnT>
+                    <a:lnB w="12700" cap="flat" cmpd="sng" algn="ctr">
+                      <a:solidFill>
+                        <a:schemeClr val="tx1"/>
+                      </a:solidFill>
+                      <a:prstDash val="solid"/>
+                      <a:round/>
+                      <a:headEnd type="none" w="med" len="med"/>
+                      <a:tailEnd type="none" w="med" len="med"/>
+                    </a:lnB>
+                    <a:solidFill>
+                      <a:schemeClr val="bg1">
+                        <a:lumMod val="85000"/>
+                      </a:schemeClr>
+                    </a:solidFill>
+                  </a:tcPr>
+                </a:tc>
+                <a:extLst>
+                  <a:ext uri="{0D108BD9-81ED-4DB2-BD59-A6C34878D82A}">
+                    <a16:rowId xmlns:a16="http://schemas.microsoft.com/office/drawing/2014/main" val="1914564245"/>
+                  </a:ext>
+                </a:extLst>
+              </a:tr>
+              <a:tr h="370840">
+                <a:tc>
+                  <a:txBody>
+                    <a:bodyPr/>
+                    <a:lstStyle/>
+                    <a:p>
+                      <a:pPr marL="285750" indent="-285750">
+                        <a:buFont typeface="Arial" panose="020B0604020202020204" pitchFamily="34" charset="0"/>
+                        <a:buChar char="•"/>
+                      </a:pPr>
+                      <a:r>
+                        <a:rPr lang="en-GB" sz="1400" dirty="0"/>
+                        <a:t>Detail provide the names of each DXC delivery </a:t>
+                      </a:r>
+                      <a:r>
+                        <a:rPr lang="en-GB" sz="1400" dirty="0" err="1"/>
+                        <a:t>center</a:t>
+                      </a:r>
+                      <a:r>
+                        <a:rPr lang="en-GB" sz="1400" dirty="0"/>
+                        <a:t> involved with this solution</a:t>
+                      </a:r>
+                    </a:p>
+                  </a:txBody>
+                  <a:tcPr>
+                    <a:lnL w="12700" cap="flat" cmpd="sng" algn="ctr">
+                      <a:solidFill>
+                        <a:schemeClr val="tx1"/>
+                      </a:solidFill>
+                      <a:prstDash val="solid"/>
+                      <a:round/>
+                      <a:headEnd type="none" w="med" len="med"/>
+                      <a:tailEnd type="none" w="med" len="med"/>
+                    </a:lnL>
+                    <a:lnR w="12700" cap="flat" cmpd="sng" algn="ctr">
+                      <a:solidFill>
+                        <a:schemeClr val="tx1"/>
+                      </a:solidFill>
+                      <a:prstDash val="solid"/>
+                      <a:round/>
+                      <a:headEnd type="none" w="med" len="med"/>
+                      <a:tailEnd type="none" w="med" len="med"/>
+                    </a:lnR>
+                    <a:lnT w="12700" cap="flat" cmpd="sng" algn="ctr">
+                      <a:solidFill>
+                        <a:schemeClr val="tx1"/>
+                      </a:solidFill>
+                      <a:prstDash val="solid"/>
+                      <a:round/>
+                      <a:headEnd type="none" w="med" len="med"/>
+                      <a:tailEnd type="none" w="med" len="med"/>
+                    </a:lnT>
+                    <a:lnB w="12700" cap="flat" cmpd="sng" algn="ctr">
+                      <a:solidFill>
+                        <a:schemeClr val="tx1"/>
+                      </a:solidFill>
+                      <a:prstDash val="solid"/>
+                      <a:round/>
+                      <a:headEnd type="none" w="med" len="med"/>
+                      <a:tailEnd type="none" w="med" len="med"/>
+                    </a:lnB>
+                  </a:tcPr>
+                </a:tc>
+                <a:extLst>
+                  <a:ext uri="{0D108BD9-81ED-4DB2-BD59-A6C34878D82A}">
+                    <a16:rowId xmlns:a16="http://schemas.microsoft.com/office/drawing/2014/main" val="3636026272"/>
+                  </a:ext>
+                </a:extLst>
+              </a:tr>
+            </a:tbl>
+          </a:graphicData>
+        </a:graphic>
+      </p:graphicFrame>
+    </p:spTree>
+    <p:extLst>
+      <p:ext uri="{BB962C8B-B14F-4D97-AF65-F5344CB8AC3E}">
+        <p14:creationId xmlns:p14="http://schemas.microsoft.com/office/powerpoint/2010/main" val="269264897"/>
+      </p:ext>
+    </p:extLst>
+  </p:cSld>
+  <p:clrMapOvr>
+    <a:masterClrMapping/>
+  </p:clrMapOvr>
+  <mc:AlternateContent xmlns:mc="http://schemas.openxmlformats.org/markup-compatibility/2006" xmlns:p14="http://schemas.microsoft.com/office/powerpoint/2010/main">
+    <mc:Choice Requires="p14">
+      <p:transition spd="med" p14:dur="700">
+        <p:fade/>
+      </p:transition>
+    </mc:Choice>
+    <mc:Fallback xmlns="">
+      <p:transition spd="med">
+        <p:fade/>
+      </p:transition>
+    </mc:Fallback>
+  </mc:AlternateContent>
+</p:sld>
+</file>
+
+<file path=ppt/slides/slide4.xml><?xml version="1.0" encoding="utf-8"?>
+<p:sld xmlns:a="http://schemas.openxmlformats.org/drawingml/2006/main" xmlns:r="http://schemas.openxmlformats.org/officeDocument/2006/relationships" xmlns:p="http://schemas.openxmlformats.org/presentationml/2006/main">
+  <p:cSld>
+    <p:spTree>
+      <p:nvGrpSpPr>
+        <p:cNvPr id="1" name=""/>
+        <p:cNvGrpSpPr/>
+        <p:nvPr/>
+      </p:nvGrpSpPr>
+      <p:grpSpPr>
+        <a:xfrm>
+          <a:off x="0" y="0"/>
+          <a:ext cx="0" cy="0"/>
+          <a:chOff x="0" y="0"/>
+          <a:chExt cx="0" cy="0"/>
+        </a:xfrm>
+      </p:grpSpPr>
+      <p:sp>
+        <p:nvSpPr>
+          <p:cNvPr id="2" name="Title 1">
+            <a:extLst>
+              <a:ext uri="{FF2B5EF4-FFF2-40B4-BE49-F238E27FC236}">
+                <a16:creationId xmlns:a16="http://schemas.microsoft.com/office/drawing/2014/main" id="{2B77B97E-62A9-4F68-85A1-448CE4C9CA7A}"/>
+              </a:ext>
+            </a:extLst>
+          </p:cNvPr>
+          <p:cNvSpPr>
+            <a:spLocks noGrp="1"/>
+          </p:cNvSpPr>
+          <p:nvPr>
+            <p:ph type="title"/>
+          </p:nvPr>
+        </p:nvSpPr>
+        <p:spPr/>
+        <p:txBody>
+          <a:bodyPr/>
+          <a:lstStyle/>
+          <a:p>
+            <a:r>
+              <a:rPr lang="en-GB" sz="3200" dirty="0"/>
+              <a:t>Solution capture form </a:t>
+            </a:r>
+            <a:br>
+              <a:rPr lang="en-GB" sz="3200" dirty="0"/>
+            </a:br>
+            <a:r>
+              <a:rPr lang="en-GB" sz="2400" dirty="0"/>
+              <a:t>Page 3 - Motivations</a:t>
             </a:r>
           </a:p>
         </p:txBody>
@@ -25034,7 +25316,7 @@
 </p:sld>
 </file>
 
-<file path=ppt/slides/slide4.xml><?xml version="1.0" encoding="utf-8"?>
+<file path=ppt/slides/slide5.xml><?xml version="1.0" encoding="utf-8"?>
 <p:sld xmlns:a="http://schemas.openxmlformats.org/drawingml/2006/main" xmlns:r="http://schemas.openxmlformats.org/officeDocument/2006/relationships" xmlns:p="http://schemas.openxmlformats.org/presentationml/2006/main">
   <p:cSld>
     <p:spTree>
@@ -25528,12 +25810,16 @@
             <a:graphicFrameLocks noGrp="1"/>
           </p:cNvGraphicFramePr>
           <p:nvPr>
-            <p:extLst/>
+            <p:extLst>
+              <p:ext uri="{D42A27DB-BD31-4B8C-83A1-F6EECF244321}">
+                <p14:modId xmlns:p14="http://schemas.microsoft.com/office/powerpoint/2010/main" val="647451"/>
+              </p:ext>
+            </p:extLst>
           </p:nvPr>
         </p:nvGraphicFramePr>
         <p:xfrm>
           <a:off x="697303" y="1795318"/>
-          <a:ext cx="13257620" cy="2416526"/>
+          <a:ext cx="13262346" cy="2416526"/>
         </p:xfrm>
         <a:graphic>
           <a:graphicData uri="http://schemas.openxmlformats.org/drawingml/2006/table">
@@ -25542,31 +25828,17 @@
                 <a:tableStyleId>{45BD5076-5073-49C7-9E08-65982F3C9860}</a:tableStyleId>
               </a:tblPr>
               <a:tblGrid>
-                <a:gridCol w="3314405">
+                <a:gridCol w="6631173">
                   <a:extLst>
                     <a:ext uri="{9D8B030D-6E8A-4147-A177-3AD203B41FA5}">
                       <a16:colId xmlns:a16="http://schemas.microsoft.com/office/drawing/2014/main" val="939365373"/>
                     </a:ext>
                   </a:extLst>
                 </a:gridCol>
-                <a:gridCol w="3314405">
+                <a:gridCol w="6631173">
                   <a:extLst>
                     <a:ext uri="{9D8B030D-6E8A-4147-A177-3AD203B41FA5}">
                       <a16:colId xmlns:a16="http://schemas.microsoft.com/office/drawing/2014/main" val="4054986321"/>
-                    </a:ext>
-                  </a:extLst>
-                </a:gridCol>
-                <a:gridCol w="3314405">
-                  <a:extLst>
-                    <a:ext uri="{9D8B030D-6E8A-4147-A177-3AD203B41FA5}">
-                      <a16:colId xmlns:a16="http://schemas.microsoft.com/office/drawing/2014/main" val="2372922452"/>
-                    </a:ext>
-                  </a:extLst>
-                </a:gridCol>
-                <a:gridCol w="3314405">
-                  <a:extLst>
-                    <a:ext uri="{9D8B030D-6E8A-4147-A177-3AD203B41FA5}">
-                      <a16:colId xmlns:a16="http://schemas.microsoft.com/office/drawing/2014/main" val="2914776583"/>
                     </a:ext>
                   </a:extLst>
                 </a:gridCol>
@@ -25658,170 +25930,6 @@
                       <a:r>
                         <a:rPr lang="en-GB" sz="1400" dirty="0"/>
                         <a:t>DXC offerings</a:t>
-                      </a:r>
-                    </a:p>
-                  </a:txBody>
-                  <a:tcPr>
-                    <a:lnL w="12700" cap="flat" cmpd="sng" algn="ctr">
-                      <a:solidFill>
-                        <a:schemeClr val="tx1"/>
-                      </a:solidFill>
-                      <a:prstDash val="solid"/>
-                      <a:round/>
-                      <a:headEnd type="none" w="med" len="med"/>
-                      <a:tailEnd type="none" w="med" len="med"/>
-                    </a:lnL>
-                    <a:lnR w="12700" cap="flat" cmpd="sng" algn="ctr">
-                      <a:solidFill>
-                        <a:schemeClr val="tx1"/>
-                      </a:solidFill>
-                      <a:prstDash val="solid"/>
-                      <a:round/>
-                      <a:headEnd type="none" w="med" len="med"/>
-                      <a:tailEnd type="none" w="med" len="med"/>
-                    </a:lnR>
-                    <a:lnT w="12700" cap="flat" cmpd="sng" algn="ctr">
-                      <a:solidFill>
-                        <a:schemeClr val="tx1"/>
-                      </a:solidFill>
-                      <a:prstDash val="solid"/>
-                      <a:round/>
-                      <a:headEnd type="none" w="med" len="med"/>
-                      <a:tailEnd type="none" w="med" len="med"/>
-                    </a:lnT>
-                    <a:lnB w="12700" cap="flat" cmpd="sng" algn="ctr">
-                      <a:solidFill>
-                        <a:schemeClr val="tx1"/>
-                      </a:solidFill>
-                      <a:prstDash val="solid"/>
-                      <a:round/>
-                      <a:headEnd type="none" w="med" len="med"/>
-                      <a:tailEnd type="none" w="med" len="med"/>
-                    </a:lnB>
-                    <a:lnTlToBr w="12700" cmpd="sng">
-                      <a:noFill/>
-                      <a:prstDash val="solid"/>
-                    </a:lnTlToBr>
-                    <a:lnBlToTr w="12700" cmpd="sng">
-                      <a:noFill/>
-                      <a:prstDash val="solid"/>
-                    </a:lnBlToTr>
-                    <a:solidFill>
-                      <a:schemeClr val="accent6"/>
-                    </a:solidFill>
-                  </a:tcPr>
-                </a:tc>
-                <a:tc>
-                  <a:txBody>
-                    <a:bodyPr/>
-                    <a:lstStyle/>
-                    <a:p>
-                      <a:pPr marL="0" marR="0" lvl="0" indent="0" algn="l" defTabSz="1463040" rtl="0" eaLnBrk="1" fontAlgn="auto" latinLnBrk="0" hangingPunct="1">
-                        <a:lnSpc>
-                          <a:spcPct val="100000"/>
-                        </a:lnSpc>
-                        <a:spcBef>
-                          <a:spcPts val="0"/>
-                        </a:spcBef>
-                        <a:spcAft>
-                          <a:spcPts val="0"/>
-                        </a:spcAft>
-                        <a:buClrTx/>
-                        <a:buSzTx/>
-                        <a:buFontTx/>
-                        <a:buNone/>
-                        <a:tabLst/>
-                        <a:defRPr/>
-                      </a:pPr>
-                      <a:r>
-                        <a:rPr lang="en-GB" sz="1400" dirty="0"/>
-                        <a:t>Partners and 3</a:t>
-                      </a:r>
-                      <a:r>
-                        <a:rPr lang="en-GB" sz="1400" baseline="30000" dirty="0"/>
-                        <a:t>rd</a:t>
-                      </a:r>
-                      <a:r>
-                        <a:rPr lang="en-GB" sz="1400" dirty="0"/>
-                        <a:t> party capabilities</a:t>
-                      </a:r>
-                    </a:p>
-                  </a:txBody>
-                  <a:tcPr>
-                    <a:lnL w="12700" cap="flat" cmpd="sng" algn="ctr">
-                      <a:solidFill>
-                        <a:schemeClr val="tx1"/>
-                      </a:solidFill>
-                      <a:prstDash val="solid"/>
-                      <a:round/>
-                      <a:headEnd type="none" w="med" len="med"/>
-                      <a:tailEnd type="none" w="med" len="med"/>
-                    </a:lnL>
-                    <a:lnR w="12700" cap="flat" cmpd="sng" algn="ctr">
-                      <a:solidFill>
-                        <a:schemeClr val="tx1"/>
-                      </a:solidFill>
-                      <a:prstDash val="solid"/>
-                      <a:round/>
-                      <a:headEnd type="none" w="med" len="med"/>
-                      <a:tailEnd type="none" w="med" len="med"/>
-                    </a:lnR>
-                    <a:lnT w="12700" cap="flat" cmpd="sng" algn="ctr">
-                      <a:solidFill>
-                        <a:schemeClr val="tx1"/>
-                      </a:solidFill>
-                      <a:prstDash val="solid"/>
-                      <a:round/>
-                      <a:headEnd type="none" w="med" len="med"/>
-                      <a:tailEnd type="none" w="med" len="med"/>
-                    </a:lnT>
-                    <a:lnB w="12700" cap="flat" cmpd="sng" algn="ctr">
-                      <a:solidFill>
-                        <a:schemeClr val="tx1"/>
-                      </a:solidFill>
-                      <a:prstDash val="solid"/>
-                      <a:round/>
-                      <a:headEnd type="none" w="med" len="med"/>
-                      <a:tailEnd type="none" w="med" len="med"/>
-                    </a:lnB>
-                    <a:lnTlToBr w="12700" cmpd="sng">
-                      <a:noFill/>
-                      <a:prstDash val="solid"/>
-                    </a:lnTlToBr>
-                    <a:lnBlToTr w="12700" cmpd="sng">
-                      <a:noFill/>
-                      <a:prstDash val="solid"/>
-                    </a:lnBlToTr>
-                    <a:solidFill>
-                      <a:schemeClr val="accent6"/>
-                    </a:solidFill>
-                  </a:tcPr>
-                </a:tc>
-                <a:tc>
-                  <a:txBody>
-                    <a:bodyPr/>
-                    <a:lstStyle/>
-                    <a:p>
-                      <a:pPr marL="0" marR="0" lvl="0" indent="0" algn="l" defTabSz="1463040" rtl="0" eaLnBrk="1" fontAlgn="auto" latinLnBrk="0" hangingPunct="1">
-                        <a:lnSpc>
-                          <a:spcPct val="100000"/>
-                        </a:lnSpc>
-                        <a:spcBef>
-                          <a:spcPts val="0"/>
-                        </a:spcBef>
-                        <a:spcAft>
-                          <a:spcPts val="0"/>
-                        </a:spcAft>
-                        <a:buClrTx/>
-                        <a:buSzTx/>
-                        <a:buFontTx/>
-                        <a:buNone/>
-                        <a:tabLst/>
-                        <a:defRPr/>
-                      </a:pPr>
-                      <a:r>
-                        <a:rPr lang="en-GB" sz="1400" dirty="0"/>
-                        <a:t>Methods</a:t>
                       </a:r>
                     </a:p>
                   </a:txBody>
@@ -26102,242 +26210,6 @@
                     </a:lnBlToTr>
                   </a:tcPr>
                 </a:tc>
-                <a:tc>
-                  <a:txBody>
-                    <a:bodyPr/>
-                    <a:lstStyle/>
-                    <a:p>
-                      <a:pPr marL="0" indent="0" algn="l" defTabSz="1463040" rtl="0" eaLnBrk="1" latinLnBrk="0" hangingPunct="1">
-                        <a:buFont typeface="Arial" panose="020B0604020202020204" pitchFamily="34" charset="0"/>
-                        <a:buNone/>
-                      </a:pPr>
-                      <a:r>
-                        <a:rPr lang="en-GB" sz="1400" i="1" kern="1200" dirty="0">
-                          <a:solidFill>
-                            <a:srgbClr val="000000"/>
-                          </a:solidFill>
-                          <a:latin typeface="+mn-lt"/>
-                          <a:ea typeface="+mn-ea"/>
-                          <a:cs typeface="+mn-cs"/>
-                        </a:rPr>
-                        <a:t>Examples…</a:t>
-                      </a:r>
-                    </a:p>
-                    <a:p>
-                      <a:pPr marL="285750" indent="-285750" algn="l" defTabSz="1463040" rtl="0" eaLnBrk="1" latinLnBrk="0" hangingPunct="1">
-                        <a:buFont typeface="Arial" panose="020B0604020202020204" pitchFamily="34" charset="0"/>
-                        <a:buChar char="•"/>
-                      </a:pPr>
-                      <a:r>
-                        <a:rPr lang="en-GB" sz="1400" i="1" kern="1200" dirty="0">
-                          <a:solidFill>
-                            <a:srgbClr val="000000"/>
-                          </a:solidFill>
-                          <a:latin typeface="+mn-lt"/>
-                          <a:ea typeface="+mn-ea"/>
-                          <a:cs typeface="+mn-cs"/>
-                        </a:rPr>
-                        <a:t>Redhat </a:t>
-                      </a:r>
-                      <a:r>
-                        <a:rPr lang="en-GB" sz="1400" i="1" kern="1200" dirty="0" err="1">
-                          <a:solidFill>
-                            <a:srgbClr val="000000"/>
-                          </a:solidFill>
-                          <a:latin typeface="+mn-lt"/>
-                          <a:ea typeface="+mn-ea"/>
-                          <a:cs typeface="+mn-cs"/>
-                        </a:rPr>
-                        <a:t>openshift</a:t>
-                      </a:r>
-                      <a:endParaRPr lang="en-GB" sz="1400" i="1" kern="1200" dirty="0">
-                        <a:solidFill>
-                          <a:srgbClr val="000000"/>
-                        </a:solidFill>
-                        <a:latin typeface="+mn-lt"/>
-                        <a:ea typeface="+mn-ea"/>
-                        <a:cs typeface="+mn-cs"/>
-                      </a:endParaRPr>
-                    </a:p>
-                    <a:p>
-                      <a:pPr marL="285750" indent="-285750" algn="l" defTabSz="1463040" rtl="0" eaLnBrk="1" latinLnBrk="0" hangingPunct="1">
-                        <a:buFont typeface="Arial" panose="020B0604020202020204" pitchFamily="34" charset="0"/>
-                        <a:buChar char="•"/>
-                      </a:pPr>
-                      <a:r>
-                        <a:rPr lang="en-GB" sz="1400" i="1" kern="1200" dirty="0">
-                          <a:solidFill>
-                            <a:srgbClr val="000000"/>
-                          </a:solidFill>
-                          <a:latin typeface="+mn-lt"/>
-                          <a:ea typeface="+mn-ea"/>
-                          <a:cs typeface="+mn-cs"/>
-                        </a:rPr>
-                        <a:t>Microsoft Azure hosting</a:t>
-                      </a:r>
-                    </a:p>
-                  </a:txBody>
-                  <a:tcPr>
-                    <a:lnL w="12700" cap="flat" cmpd="sng" algn="ctr">
-                      <a:solidFill>
-                        <a:schemeClr val="tx1"/>
-                      </a:solidFill>
-                      <a:prstDash val="solid"/>
-                      <a:round/>
-                      <a:headEnd type="none" w="med" len="med"/>
-                      <a:tailEnd type="none" w="med" len="med"/>
-                    </a:lnL>
-                    <a:lnR w="12700" cap="flat" cmpd="sng" algn="ctr">
-                      <a:solidFill>
-                        <a:schemeClr val="tx1"/>
-                      </a:solidFill>
-                      <a:prstDash val="solid"/>
-                      <a:round/>
-                      <a:headEnd type="none" w="med" len="med"/>
-                      <a:tailEnd type="none" w="med" len="med"/>
-                    </a:lnR>
-                    <a:lnT w="12700" cap="flat" cmpd="sng" algn="ctr">
-                      <a:solidFill>
-                        <a:schemeClr val="tx1"/>
-                      </a:solidFill>
-                      <a:prstDash val="solid"/>
-                      <a:round/>
-                      <a:headEnd type="none" w="med" len="med"/>
-                      <a:tailEnd type="none" w="med" len="med"/>
-                    </a:lnT>
-                    <a:lnB w="12700" cap="flat" cmpd="sng" algn="ctr">
-                      <a:solidFill>
-                        <a:schemeClr val="tx1"/>
-                      </a:solidFill>
-                      <a:prstDash val="solid"/>
-                      <a:round/>
-                      <a:headEnd type="none" w="med" len="med"/>
-                      <a:tailEnd type="none" w="med" len="med"/>
-                    </a:lnB>
-                    <a:lnTlToBr w="12700" cmpd="sng">
-                      <a:noFill/>
-                      <a:prstDash val="solid"/>
-                    </a:lnTlToBr>
-                    <a:lnBlToTr w="12700" cmpd="sng">
-                      <a:noFill/>
-                      <a:prstDash val="solid"/>
-                    </a:lnBlToTr>
-                  </a:tcPr>
-                </a:tc>
-                <a:tc>
-                  <a:txBody>
-                    <a:bodyPr/>
-                    <a:lstStyle/>
-                    <a:p>
-                      <a:pPr marL="0" indent="0" algn="l" defTabSz="1463040" rtl="0" eaLnBrk="1" latinLnBrk="0" hangingPunct="1">
-                        <a:buFont typeface="Arial" panose="020B0604020202020204" pitchFamily="34" charset="0"/>
-                        <a:buNone/>
-                      </a:pPr>
-                      <a:r>
-                        <a:rPr lang="en-GB" sz="1400" i="1" kern="1200" dirty="0">
-                          <a:solidFill>
-                            <a:srgbClr val="000000"/>
-                          </a:solidFill>
-                          <a:latin typeface="+mn-lt"/>
-                          <a:ea typeface="+mn-ea"/>
-                          <a:cs typeface="+mn-cs"/>
-                        </a:rPr>
-                        <a:t>Examples…</a:t>
-                      </a:r>
-                    </a:p>
-                    <a:p>
-                      <a:pPr marL="285750" indent="-285750" algn="l" defTabSz="1463040" rtl="0" eaLnBrk="1" latinLnBrk="0" hangingPunct="1">
-                        <a:buFont typeface="Arial" panose="020B0604020202020204" pitchFamily="34" charset="0"/>
-                        <a:buChar char="•"/>
-                      </a:pPr>
-                      <a:r>
-                        <a:rPr lang="en-GB" sz="1400" i="1" kern="1200" dirty="0">
-                          <a:solidFill>
-                            <a:srgbClr val="000000"/>
-                          </a:solidFill>
-                          <a:latin typeface="+mn-lt"/>
-                          <a:ea typeface="+mn-ea"/>
-                          <a:cs typeface="+mn-cs"/>
-                        </a:rPr>
-                        <a:t>Agile</a:t>
-                      </a:r>
-                    </a:p>
-                    <a:p>
-                      <a:pPr marL="285750" indent="-285750" algn="l" defTabSz="1463040" rtl="0" eaLnBrk="1" latinLnBrk="0" hangingPunct="1">
-                        <a:buFont typeface="Arial" panose="020B0604020202020204" pitchFamily="34" charset="0"/>
-                        <a:buChar char="•"/>
-                      </a:pPr>
-                      <a:endParaRPr lang="en-GB" sz="1400" i="1" kern="1200" dirty="0">
-                        <a:solidFill>
-                          <a:srgbClr val="000000"/>
-                        </a:solidFill>
-                        <a:latin typeface="+mn-lt"/>
-                        <a:ea typeface="+mn-ea"/>
-                        <a:cs typeface="+mn-cs"/>
-                      </a:endParaRPr>
-                    </a:p>
-                    <a:p>
-                      <a:pPr marL="285750" indent="-285750" algn="l" defTabSz="1463040" rtl="0" eaLnBrk="1" latinLnBrk="0" hangingPunct="1">
-                        <a:buFont typeface="Arial" panose="020B0604020202020204" pitchFamily="34" charset="0"/>
-                        <a:buChar char="•"/>
-                      </a:pPr>
-                      <a:endParaRPr lang="en-GB" sz="1400" i="1" kern="1200" dirty="0">
-                        <a:solidFill>
-                          <a:srgbClr val="000000"/>
-                        </a:solidFill>
-                        <a:latin typeface="+mn-lt"/>
-                        <a:ea typeface="+mn-ea"/>
-                        <a:cs typeface="+mn-cs"/>
-                      </a:endParaRPr>
-                    </a:p>
-                  </a:txBody>
-                  <a:tcPr>
-                    <a:lnL w="12700" cap="flat" cmpd="sng" algn="ctr">
-                      <a:solidFill>
-                        <a:schemeClr val="tx1"/>
-                      </a:solidFill>
-                      <a:prstDash val="solid"/>
-                      <a:round/>
-                      <a:headEnd type="none" w="med" len="med"/>
-                      <a:tailEnd type="none" w="med" len="med"/>
-                    </a:lnL>
-                    <a:lnR w="12700" cap="flat" cmpd="sng" algn="ctr">
-                      <a:solidFill>
-                        <a:schemeClr val="tx1"/>
-                      </a:solidFill>
-                      <a:prstDash val="solid"/>
-                      <a:round/>
-                      <a:headEnd type="none" w="med" len="med"/>
-                      <a:tailEnd type="none" w="med" len="med"/>
-                    </a:lnR>
-                    <a:lnT w="12700" cap="flat" cmpd="sng" algn="ctr">
-                      <a:solidFill>
-                        <a:schemeClr val="tx1"/>
-                      </a:solidFill>
-                      <a:prstDash val="solid"/>
-                      <a:round/>
-                      <a:headEnd type="none" w="med" len="med"/>
-                      <a:tailEnd type="none" w="med" len="med"/>
-                    </a:lnT>
-                    <a:lnB w="12700" cap="flat" cmpd="sng" algn="ctr">
-                      <a:solidFill>
-                        <a:schemeClr val="tx1"/>
-                      </a:solidFill>
-                      <a:prstDash val="solid"/>
-                      <a:round/>
-                      <a:headEnd type="none" w="med" len="med"/>
-                      <a:tailEnd type="none" w="med" len="med"/>
-                    </a:lnB>
-                    <a:lnTlToBr w="12700" cmpd="sng">
-                      <a:noFill/>
-                      <a:prstDash val="solid"/>
-                    </a:lnTlToBr>
-                    <a:lnBlToTr w="12700" cmpd="sng">
-                      <a:noFill/>
-                      <a:prstDash val="solid"/>
-                    </a:lnBlToTr>
-                  </a:tcPr>
-                </a:tc>
                 <a:extLst>
                   <a:ext uri="{0D108BD9-81ED-4DB2-BD59-A6C34878D82A}">
                     <a16:rowId xmlns:a16="http://schemas.microsoft.com/office/drawing/2014/main" val="2776288301"/>
@@ -26404,7 +26276,7 @@
             </a:br>
             <a:r>
               <a:rPr lang="en-GB" sz="2400" dirty="0"/>
-              <a:t>Page 3 – Features * </a:t>
+              <a:t>Page 4 – Capabilities &amp; Offerings</a:t>
             </a:r>
           </a:p>
         </p:txBody>
@@ -26469,7 +26341,7 @@
 </p:sld>
 </file>
 
-<file path=ppt/slides/slide5.xml><?xml version="1.0" encoding="utf-8"?>
+<file path=ppt/slides/slide6.xml><?xml version="1.0" encoding="utf-8"?>
 <p:sld xmlns:a="http://schemas.openxmlformats.org/drawingml/2006/main" xmlns:r="http://schemas.openxmlformats.org/officeDocument/2006/relationships" xmlns:p="http://schemas.openxmlformats.org/presentationml/2006/main">
   <p:cSld>
     <p:spTree>

</xml_diff>